<commit_message>
big restructure of content
</commit_message>
<xml_diff>
--- a/images/images.pptx
+++ b/images/images.pptx
@@ -4,10 +4,19 @@
   <p:sldMasterIdLst>
     <p:sldMasterId id="2147483648" r:id="rId1"/>
   </p:sldMasterIdLst>
+  <p:notesMasterIdLst>
+    <p:notesMasterId r:id="rId11"/>
+  </p:notesMasterIdLst>
   <p:sldIdLst>
     <p:sldId id="256" r:id="rId2"/>
     <p:sldId id="257" r:id="rId3"/>
     <p:sldId id="258" r:id="rId4"/>
+    <p:sldId id="259" r:id="rId5"/>
+    <p:sldId id="262" r:id="rId6"/>
+    <p:sldId id="260" r:id="rId7"/>
+    <p:sldId id="264" r:id="rId8"/>
+    <p:sldId id="8544" r:id="rId9"/>
+    <p:sldId id="263" r:id="rId10"/>
   </p:sldIdLst>
   <p:sldSz cx="12192000" cy="6858000"/>
   <p:notesSz cx="6858000" cy="9144000"/>
@@ -106,7 +115,361 @@
       </a:defRPr>
     </a:lvl9pPr>
   </p:defaultTextStyle>
+  <p:extLst>
+    <p:ext uri="{EFAFB233-063F-42B5-8137-9DF3F51BA10A}">
+      <p15:sldGuideLst xmlns:p15="http://schemas.microsoft.com/office/powerpoint/2012/main"/>
+    </p:ext>
+  </p:extLst>
 </p:presentation>
+</file>
+
+<file path=ppt/notesMasters/notesMaster1.xml><?xml version="1.0" encoding="utf-8"?>
+<p:notesMaster xmlns:a="http://schemas.openxmlformats.org/drawingml/2006/main" xmlns:r="http://schemas.openxmlformats.org/officeDocument/2006/relationships" xmlns:p="http://schemas.openxmlformats.org/presentationml/2006/main">
+  <p:cSld>
+    <p:bg>
+      <p:bgRef idx="1001">
+        <a:schemeClr val="bg1"/>
+      </p:bgRef>
+    </p:bg>
+    <p:spTree>
+      <p:nvGrpSpPr>
+        <p:cNvPr id="1" name=""/>
+        <p:cNvGrpSpPr/>
+        <p:nvPr/>
+      </p:nvGrpSpPr>
+      <p:grpSpPr>
+        <a:xfrm>
+          <a:off x="0" y="0"/>
+          <a:ext cx="0" cy="0"/>
+          <a:chOff x="0" y="0"/>
+          <a:chExt cx="0" cy="0"/>
+        </a:xfrm>
+      </p:grpSpPr>
+      <p:sp>
+        <p:nvSpPr>
+          <p:cNvPr id="2" name="Header Placeholder 1"/>
+          <p:cNvSpPr>
+            <a:spLocks noGrp="1"/>
+          </p:cNvSpPr>
+          <p:nvPr>
+            <p:ph type="hdr" sz="quarter"/>
+          </p:nvPr>
+        </p:nvSpPr>
+        <p:spPr>
+          <a:xfrm>
+            <a:off x="0" y="0"/>
+            <a:ext cx="2971800" cy="458788"/>
+          </a:xfrm>
+          <a:prstGeom prst="rect">
+            <a:avLst/>
+          </a:prstGeom>
+        </p:spPr>
+        <p:txBody>
+          <a:bodyPr vert="horz" lIns="91440" tIns="45720" rIns="91440" bIns="45720" rtlCol="0"/>
+          <a:lstStyle>
+            <a:lvl1pPr algn="l">
+              <a:defRPr sz="1200"/>
+            </a:lvl1pPr>
+          </a:lstStyle>
+          <a:p>
+            <a:endParaRPr lang="en-US"/>
+          </a:p>
+        </p:txBody>
+      </p:sp>
+      <p:sp>
+        <p:nvSpPr>
+          <p:cNvPr id="3" name="Date Placeholder 2"/>
+          <p:cNvSpPr>
+            <a:spLocks noGrp="1"/>
+          </p:cNvSpPr>
+          <p:nvPr>
+            <p:ph type="dt" idx="1"/>
+          </p:nvPr>
+        </p:nvSpPr>
+        <p:spPr>
+          <a:xfrm>
+            <a:off x="3884613" y="0"/>
+            <a:ext cx="2971800" cy="458788"/>
+          </a:xfrm>
+          <a:prstGeom prst="rect">
+            <a:avLst/>
+          </a:prstGeom>
+        </p:spPr>
+        <p:txBody>
+          <a:bodyPr vert="horz" lIns="91440" tIns="45720" rIns="91440" bIns="45720" rtlCol="0"/>
+          <a:lstStyle>
+            <a:lvl1pPr algn="r">
+              <a:defRPr sz="1200"/>
+            </a:lvl1pPr>
+          </a:lstStyle>
+          <a:p>
+            <a:fld id="{41F557B7-EB12-704B-96E8-04D54431924A}" type="datetimeFigureOut">
+              <a:rPr lang="en-US" smtClean="0"/>
+              <a:t>12/23/21</a:t>
+            </a:fld>
+            <a:endParaRPr lang="en-US"/>
+          </a:p>
+        </p:txBody>
+      </p:sp>
+      <p:sp>
+        <p:nvSpPr>
+          <p:cNvPr id="4" name="Slide Image Placeholder 3"/>
+          <p:cNvSpPr>
+            <a:spLocks noGrp="1" noRot="1" noChangeAspect="1"/>
+          </p:cNvSpPr>
+          <p:nvPr>
+            <p:ph type="sldImg" idx="2"/>
+          </p:nvPr>
+        </p:nvSpPr>
+        <p:spPr>
+          <a:xfrm>
+            <a:off x="685800" y="1143000"/>
+            <a:ext cx="5486400" cy="3086100"/>
+          </a:xfrm>
+          <a:prstGeom prst="rect">
+            <a:avLst/>
+          </a:prstGeom>
+          <a:noFill/>
+          <a:ln w="12700">
+            <a:solidFill>
+              <a:prstClr val="black"/>
+            </a:solidFill>
+          </a:ln>
+        </p:spPr>
+        <p:txBody>
+          <a:bodyPr vert="horz" lIns="91440" tIns="45720" rIns="91440" bIns="45720" rtlCol="0" anchor="ctr"/>
+          <a:lstStyle/>
+          <a:p>
+            <a:endParaRPr lang="en-US"/>
+          </a:p>
+        </p:txBody>
+      </p:sp>
+      <p:sp>
+        <p:nvSpPr>
+          <p:cNvPr id="5" name="Notes Placeholder 4"/>
+          <p:cNvSpPr>
+            <a:spLocks noGrp="1"/>
+          </p:cNvSpPr>
+          <p:nvPr>
+            <p:ph type="body" sz="quarter" idx="3"/>
+          </p:nvPr>
+        </p:nvSpPr>
+        <p:spPr>
+          <a:xfrm>
+            <a:off x="685800" y="4400550"/>
+            <a:ext cx="5486400" cy="3600450"/>
+          </a:xfrm>
+          <a:prstGeom prst="rect">
+            <a:avLst/>
+          </a:prstGeom>
+        </p:spPr>
+        <p:txBody>
+          <a:bodyPr vert="horz" lIns="91440" tIns="45720" rIns="91440" bIns="45720" rtlCol="0"/>
+          <a:lstStyle/>
+          <a:p>
+            <a:pPr lvl="0"/>
+            <a:r>
+              <a:rPr lang="en-US"/>
+              <a:t>Click to edit Master text styles</a:t>
+            </a:r>
+          </a:p>
+          <a:p>
+            <a:pPr lvl="1"/>
+            <a:r>
+              <a:rPr lang="en-US"/>
+              <a:t>Second level</a:t>
+            </a:r>
+          </a:p>
+          <a:p>
+            <a:pPr lvl="2"/>
+            <a:r>
+              <a:rPr lang="en-US"/>
+              <a:t>Third level</a:t>
+            </a:r>
+          </a:p>
+          <a:p>
+            <a:pPr lvl="3"/>
+            <a:r>
+              <a:rPr lang="en-US"/>
+              <a:t>Fourth level</a:t>
+            </a:r>
+          </a:p>
+          <a:p>
+            <a:pPr lvl="4"/>
+            <a:r>
+              <a:rPr lang="en-US"/>
+              <a:t>Fifth level</a:t>
+            </a:r>
+          </a:p>
+        </p:txBody>
+      </p:sp>
+      <p:sp>
+        <p:nvSpPr>
+          <p:cNvPr id="6" name="Footer Placeholder 5"/>
+          <p:cNvSpPr>
+            <a:spLocks noGrp="1"/>
+          </p:cNvSpPr>
+          <p:nvPr>
+            <p:ph type="ftr" sz="quarter" idx="4"/>
+          </p:nvPr>
+        </p:nvSpPr>
+        <p:spPr>
+          <a:xfrm>
+            <a:off x="0" y="8685213"/>
+            <a:ext cx="2971800" cy="458787"/>
+          </a:xfrm>
+          <a:prstGeom prst="rect">
+            <a:avLst/>
+          </a:prstGeom>
+        </p:spPr>
+        <p:txBody>
+          <a:bodyPr vert="horz" lIns="91440" tIns="45720" rIns="91440" bIns="45720" rtlCol="0" anchor="b"/>
+          <a:lstStyle>
+            <a:lvl1pPr algn="l">
+              <a:defRPr sz="1200"/>
+            </a:lvl1pPr>
+          </a:lstStyle>
+          <a:p>
+            <a:endParaRPr lang="en-US"/>
+          </a:p>
+        </p:txBody>
+      </p:sp>
+      <p:sp>
+        <p:nvSpPr>
+          <p:cNvPr id="7" name="Slide Number Placeholder 6"/>
+          <p:cNvSpPr>
+            <a:spLocks noGrp="1"/>
+          </p:cNvSpPr>
+          <p:nvPr>
+            <p:ph type="sldNum" sz="quarter" idx="5"/>
+          </p:nvPr>
+        </p:nvSpPr>
+        <p:spPr>
+          <a:xfrm>
+            <a:off x="3884613" y="8685213"/>
+            <a:ext cx="2971800" cy="458787"/>
+          </a:xfrm>
+          <a:prstGeom prst="rect">
+            <a:avLst/>
+          </a:prstGeom>
+        </p:spPr>
+        <p:txBody>
+          <a:bodyPr vert="horz" lIns="91440" tIns="45720" rIns="91440" bIns="45720" rtlCol="0" anchor="b"/>
+          <a:lstStyle>
+            <a:lvl1pPr algn="r">
+              <a:defRPr sz="1200"/>
+            </a:lvl1pPr>
+          </a:lstStyle>
+          <a:p>
+            <a:fld id="{C00D4C4C-D1C7-3D41-B283-0862B84690A9}" type="slidenum">
+              <a:rPr lang="en-US" smtClean="0"/>
+              <a:t>‹#›</a:t>
+            </a:fld>
+            <a:endParaRPr lang="en-US"/>
+          </a:p>
+        </p:txBody>
+      </p:sp>
+    </p:spTree>
+    <p:extLst>
+      <p:ext uri="{BB962C8B-B14F-4D97-AF65-F5344CB8AC3E}">
+        <p14:creationId xmlns:p14="http://schemas.microsoft.com/office/powerpoint/2010/main" val="1297849560"/>
+      </p:ext>
+    </p:extLst>
+  </p:cSld>
+  <p:clrMap bg1="lt1" tx1="dk1" bg2="lt2" tx2="dk2" accent1="accent1" accent2="accent2" accent3="accent3" accent4="accent4" accent5="accent5" accent6="accent6" hlink="hlink" folHlink="folHlink"/>
+  <p:notesStyle>
+    <a:lvl1pPr marL="0" algn="l" defTabSz="914400" rtl="0" eaLnBrk="1" latinLnBrk="0" hangingPunct="1">
+      <a:defRPr sz="1200" kern="1200">
+        <a:solidFill>
+          <a:schemeClr val="tx1"/>
+        </a:solidFill>
+        <a:latin typeface="+mn-lt"/>
+        <a:ea typeface="+mn-ea"/>
+        <a:cs typeface="+mn-cs"/>
+      </a:defRPr>
+    </a:lvl1pPr>
+    <a:lvl2pPr marL="457200" algn="l" defTabSz="914400" rtl="0" eaLnBrk="1" latinLnBrk="0" hangingPunct="1">
+      <a:defRPr sz="1200" kern="1200">
+        <a:solidFill>
+          <a:schemeClr val="tx1"/>
+        </a:solidFill>
+        <a:latin typeface="+mn-lt"/>
+        <a:ea typeface="+mn-ea"/>
+        <a:cs typeface="+mn-cs"/>
+      </a:defRPr>
+    </a:lvl2pPr>
+    <a:lvl3pPr marL="914400" algn="l" defTabSz="914400" rtl="0" eaLnBrk="1" latinLnBrk="0" hangingPunct="1">
+      <a:defRPr sz="1200" kern="1200">
+        <a:solidFill>
+          <a:schemeClr val="tx1"/>
+        </a:solidFill>
+        <a:latin typeface="+mn-lt"/>
+        <a:ea typeface="+mn-ea"/>
+        <a:cs typeface="+mn-cs"/>
+      </a:defRPr>
+    </a:lvl3pPr>
+    <a:lvl4pPr marL="1371600" algn="l" defTabSz="914400" rtl="0" eaLnBrk="1" latinLnBrk="0" hangingPunct="1">
+      <a:defRPr sz="1200" kern="1200">
+        <a:solidFill>
+          <a:schemeClr val="tx1"/>
+        </a:solidFill>
+        <a:latin typeface="+mn-lt"/>
+        <a:ea typeface="+mn-ea"/>
+        <a:cs typeface="+mn-cs"/>
+      </a:defRPr>
+    </a:lvl4pPr>
+    <a:lvl5pPr marL="1828800" algn="l" defTabSz="914400" rtl="0" eaLnBrk="1" latinLnBrk="0" hangingPunct="1">
+      <a:defRPr sz="1200" kern="1200">
+        <a:solidFill>
+          <a:schemeClr val="tx1"/>
+        </a:solidFill>
+        <a:latin typeface="+mn-lt"/>
+        <a:ea typeface="+mn-ea"/>
+        <a:cs typeface="+mn-cs"/>
+      </a:defRPr>
+    </a:lvl5pPr>
+    <a:lvl6pPr marL="2286000" algn="l" defTabSz="914400" rtl="0" eaLnBrk="1" latinLnBrk="0" hangingPunct="1">
+      <a:defRPr sz="1200" kern="1200">
+        <a:solidFill>
+          <a:schemeClr val="tx1"/>
+        </a:solidFill>
+        <a:latin typeface="+mn-lt"/>
+        <a:ea typeface="+mn-ea"/>
+        <a:cs typeface="+mn-cs"/>
+      </a:defRPr>
+    </a:lvl6pPr>
+    <a:lvl7pPr marL="2743200" algn="l" defTabSz="914400" rtl="0" eaLnBrk="1" latinLnBrk="0" hangingPunct="1">
+      <a:defRPr sz="1200" kern="1200">
+        <a:solidFill>
+          <a:schemeClr val="tx1"/>
+        </a:solidFill>
+        <a:latin typeface="+mn-lt"/>
+        <a:ea typeface="+mn-ea"/>
+        <a:cs typeface="+mn-cs"/>
+      </a:defRPr>
+    </a:lvl7pPr>
+    <a:lvl8pPr marL="3200400" algn="l" defTabSz="914400" rtl="0" eaLnBrk="1" latinLnBrk="0" hangingPunct="1">
+      <a:defRPr sz="1200" kern="1200">
+        <a:solidFill>
+          <a:schemeClr val="tx1"/>
+        </a:solidFill>
+        <a:latin typeface="+mn-lt"/>
+        <a:ea typeface="+mn-ea"/>
+        <a:cs typeface="+mn-cs"/>
+      </a:defRPr>
+    </a:lvl8pPr>
+    <a:lvl9pPr marL="3657600" algn="l" defTabSz="914400" rtl="0" eaLnBrk="1" latinLnBrk="0" hangingPunct="1">
+      <a:defRPr sz="1200" kern="1200">
+        <a:solidFill>
+          <a:schemeClr val="tx1"/>
+        </a:solidFill>
+        <a:latin typeface="+mn-lt"/>
+        <a:ea typeface="+mn-ea"/>
+        <a:cs typeface="+mn-cs"/>
+      </a:defRPr>
+    </a:lvl9pPr>
+  </p:notesStyle>
+</p:notesMaster>
 </file>
 
 <file path=ppt/slideLayouts/slideLayout1.xml><?xml version="1.0" encoding="utf-8"?>
@@ -256,7 +619,7 @@
           <a:p>
             <a:fld id="{F7A44A9A-E350-8C46-A002-3E5A89CB43BD}" type="datetimeFigureOut">
               <a:rPr lang="en-US" smtClean="0"/>
-              <a:t>12/17/21</a:t>
+              <a:t>12/23/21</a:t>
             </a:fld>
             <a:endParaRPr lang="en-US"/>
           </a:p>
@@ -454,7 +817,7 @@
           <a:p>
             <a:fld id="{F7A44A9A-E350-8C46-A002-3E5A89CB43BD}" type="datetimeFigureOut">
               <a:rPr lang="en-US" smtClean="0"/>
-              <a:t>12/17/21</a:t>
+              <a:t>12/23/21</a:t>
             </a:fld>
             <a:endParaRPr lang="en-US"/>
           </a:p>
@@ -662,7 +1025,7 @@
           <a:p>
             <a:fld id="{F7A44A9A-E350-8C46-A002-3E5A89CB43BD}" type="datetimeFigureOut">
               <a:rPr lang="en-US" smtClean="0"/>
-              <a:t>12/17/21</a:t>
+              <a:t>12/23/21</a:t>
             </a:fld>
             <a:endParaRPr lang="en-US"/>
           </a:p>
@@ -860,7 +1223,7 @@
           <a:p>
             <a:fld id="{F7A44A9A-E350-8C46-A002-3E5A89CB43BD}" type="datetimeFigureOut">
               <a:rPr lang="en-US" smtClean="0"/>
-              <a:t>12/17/21</a:t>
+              <a:t>12/23/21</a:t>
             </a:fld>
             <a:endParaRPr lang="en-US"/>
           </a:p>
@@ -1135,7 +1498,7 @@
           <a:p>
             <a:fld id="{F7A44A9A-E350-8C46-A002-3E5A89CB43BD}" type="datetimeFigureOut">
               <a:rPr lang="en-US" smtClean="0"/>
-              <a:t>12/17/21</a:t>
+              <a:t>12/23/21</a:t>
             </a:fld>
             <a:endParaRPr lang="en-US"/>
           </a:p>
@@ -1400,7 +1763,7 @@
           <a:p>
             <a:fld id="{F7A44A9A-E350-8C46-A002-3E5A89CB43BD}" type="datetimeFigureOut">
               <a:rPr lang="en-US" smtClean="0"/>
-              <a:t>12/17/21</a:t>
+              <a:t>12/23/21</a:t>
             </a:fld>
             <a:endParaRPr lang="en-US"/>
           </a:p>
@@ -1812,7 +2175,7 @@
           <a:p>
             <a:fld id="{F7A44A9A-E350-8C46-A002-3E5A89CB43BD}" type="datetimeFigureOut">
               <a:rPr lang="en-US" smtClean="0"/>
-              <a:t>12/17/21</a:t>
+              <a:t>12/23/21</a:t>
             </a:fld>
             <a:endParaRPr lang="en-US"/>
           </a:p>
@@ -1953,7 +2316,7 @@
           <a:p>
             <a:fld id="{F7A44A9A-E350-8C46-A002-3E5A89CB43BD}" type="datetimeFigureOut">
               <a:rPr lang="en-US" smtClean="0"/>
-              <a:t>12/17/21</a:t>
+              <a:t>12/23/21</a:t>
             </a:fld>
             <a:endParaRPr lang="en-US"/>
           </a:p>
@@ -2066,7 +2429,7 @@
           <a:p>
             <a:fld id="{F7A44A9A-E350-8C46-A002-3E5A89CB43BD}" type="datetimeFigureOut">
               <a:rPr lang="en-US" smtClean="0"/>
-              <a:t>12/17/21</a:t>
+              <a:t>12/23/21</a:t>
             </a:fld>
             <a:endParaRPr lang="en-US"/>
           </a:p>
@@ -2377,7 +2740,7 @@
           <a:p>
             <a:fld id="{F7A44A9A-E350-8C46-A002-3E5A89CB43BD}" type="datetimeFigureOut">
               <a:rPr lang="en-US" smtClean="0"/>
-              <a:t>12/17/21</a:t>
+              <a:t>12/23/21</a:t>
             </a:fld>
             <a:endParaRPr lang="en-US"/>
           </a:p>
@@ -2665,7 +3028,7 @@
           <a:p>
             <a:fld id="{F7A44A9A-E350-8C46-A002-3E5A89CB43BD}" type="datetimeFigureOut">
               <a:rPr lang="en-US" smtClean="0"/>
-              <a:t>12/17/21</a:t>
+              <a:t>12/23/21</a:t>
             </a:fld>
             <a:endParaRPr lang="en-US"/>
           </a:p>
@@ -2906,7 +3269,7 @@
           <a:p>
             <a:fld id="{F7A44A9A-E350-8C46-A002-3E5A89CB43BD}" type="datetimeFigureOut">
               <a:rPr lang="en-US" smtClean="0"/>
-              <a:t>12/17/21</a:t>
+              <a:t>12/23/21</a:t>
             </a:fld>
             <a:endParaRPr lang="en-US"/>
           </a:p>
@@ -3486,6 +3849,4102 @@
 </p:sld>
 </file>
 
+<file path=ppt/slides/slide4.xml><?xml version="1.0" encoding="utf-8"?>
+<p:sld xmlns:a="http://schemas.openxmlformats.org/drawingml/2006/main" xmlns:r="http://schemas.openxmlformats.org/officeDocument/2006/relationships" xmlns:p="http://schemas.openxmlformats.org/presentationml/2006/main">
+  <p:cSld>
+    <p:spTree>
+      <p:nvGrpSpPr>
+        <p:cNvPr id="1" name=""/>
+        <p:cNvGrpSpPr/>
+        <p:nvPr/>
+      </p:nvGrpSpPr>
+      <p:grpSpPr>
+        <a:xfrm>
+          <a:off x="0" y="0"/>
+          <a:ext cx="0" cy="0"/>
+          <a:chOff x="0" y="0"/>
+          <a:chExt cx="0" cy="0"/>
+        </a:xfrm>
+      </p:grpSpPr>
+      <p:pic>
+        <p:nvPicPr>
+          <p:cNvPr id="4" name="Picture 3">
+            <a:extLst>
+              <a:ext uri="{FF2B5EF4-FFF2-40B4-BE49-F238E27FC236}">
+                <a16:creationId xmlns:a16="http://schemas.microsoft.com/office/drawing/2014/main" id="{D580B16C-775B-9348-B264-56665C2F3996}"/>
+              </a:ext>
+            </a:extLst>
+          </p:cNvPr>
+          <p:cNvPicPr>
+            <a:picLocks noChangeAspect="1"/>
+          </p:cNvPicPr>
+          <p:nvPr/>
+        </p:nvPicPr>
+        <p:blipFill>
+          <a:blip r:embed="rId2"/>
+          <a:stretch>
+            <a:fillRect/>
+          </a:stretch>
+        </p:blipFill>
+        <p:spPr>
+          <a:xfrm>
+            <a:off x="1550130" y="1147083"/>
+            <a:ext cx="9284413" cy="3762434"/>
+          </a:xfrm>
+          <a:prstGeom prst="rect">
+            <a:avLst/>
+          </a:prstGeom>
+        </p:spPr>
+      </p:pic>
+      <p:sp>
+        <p:nvSpPr>
+          <p:cNvPr id="5" name="Right Arrow 4">
+            <a:extLst>
+              <a:ext uri="{FF2B5EF4-FFF2-40B4-BE49-F238E27FC236}">
+                <a16:creationId xmlns:a16="http://schemas.microsoft.com/office/drawing/2014/main" id="{DC2BAB07-8D5F-CF4A-A7C3-E4E94E8F8778}"/>
+              </a:ext>
+            </a:extLst>
+          </p:cNvPr>
+          <p:cNvSpPr/>
+          <p:nvPr/>
+        </p:nvSpPr>
+        <p:spPr>
+          <a:xfrm>
+            <a:off x="2578814" y="2837778"/>
+            <a:ext cx="2292122" cy="901874"/>
+          </a:xfrm>
+          <a:prstGeom prst="rightArrow">
+            <a:avLst/>
+          </a:prstGeom>
+          <a:solidFill>
+            <a:srgbClr val="FFFF00"/>
+          </a:solidFill>
+        </p:spPr>
+        <p:style>
+          <a:lnRef idx="2">
+            <a:schemeClr val="accent1">
+              <a:shade val="50000"/>
+            </a:schemeClr>
+          </a:lnRef>
+          <a:fillRef idx="1">
+            <a:schemeClr val="accent1"/>
+          </a:fillRef>
+          <a:effectRef idx="0">
+            <a:schemeClr val="accent1"/>
+          </a:effectRef>
+          <a:fontRef idx="minor">
+            <a:schemeClr val="lt1"/>
+          </a:fontRef>
+        </p:style>
+        <p:txBody>
+          <a:bodyPr rtlCol="0" anchor="ctr"/>
+          <a:lstStyle/>
+          <a:p>
+            <a:pPr algn="ctr"/>
+            <a:r>
+              <a:rPr lang="en-US" dirty="0">
+                <a:solidFill>
+                  <a:schemeClr val="tx1"/>
+                </a:solidFill>
+              </a:rPr>
+              <a:t>Enabled By Default</a:t>
+            </a:r>
+          </a:p>
+        </p:txBody>
+      </p:sp>
+      <p:pic>
+        <p:nvPicPr>
+          <p:cNvPr id="6" name="Picture 5">
+            <a:extLst>
+              <a:ext uri="{FF2B5EF4-FFF2-40B4-BE49-F238E27FC236}">
+                <a16:creationId xmlns:a16="http://schemas.microsoft.com/office/drawing/2014/main" id="{48D81A27-2295-1243-8B84-A23CFDAA105B}"/>
+              </a:ext>
+            </a:extLst>
+          </p:cNvPr>
+          <p:cNvPicPr>
+            <a:picLocks noChangeAspect="1"/>
+          </p:cNvPicPr>
+          <p:nvPr/>
+        </p:nvPicPr>
+        <p:blipFill>
+          <a:blip r:embed="rId3"/>
+          <a:stretch>
+            <a:fillRect/>
+          </a:stretch>
+        </p:blipFill>
+        <p:spPr>
+          <a:xfrm>
+            <a:off x="503433" y="434283"/>
+            <a:ext cx="7709185" cy="3116296"/>
+          </a:xfrm>
+          <a:prstGeom prst="rect">
+            <a:avLst/>
+          </a:prstGeom>
+        </p:spPr>
+      </p:pic>
+    </p:spTree>
+    <p:extLst>
+      <p:ext uri="{BB962C8B-B14F-4D97-AF65-F5344CB8AC3E}">
+        <p14:creationId xmlns:p14="http://schemas.microsoft.com/office/powerpoint/2010/main" val="3967451625"/>
+      </p:ext>
+    </p:extLst>
+  </p:cSld>
+  <p:clrMapOvr>
+    <a:masterClrMapping/>
+  </p:clrMapOvr>
+</p:sld>
+</file>
+
+<file path=ppt/slides/slide5.xml><?xml version="1.0" encoding="utf-8"?>
+<p:sld xmlns:a="http://schemas.openxmlformats.org/drawingml/2006/main" xmlns:r="http://schemas.openxmlformats.org/officeDocument/2006/relationships" xmlns:p="http://schemas.openxmlformats.org/presentationml/2006/main">
+  <p:cSld>
+    <p:spTree>
+      <p:nvGrpSpPr>
+        <p:cNvPr id="1" name=""/>
+        <p:cNvGrpSpPr/>
+        <p:nvPr/>
+      </p:nvGrpSpPr>
+      <p:grpSpPr>
+        <a:xfrm>
+          <a:off x="0" y="0"/>
+          <a:ext cx="0" cy="0"/>
+          <a:chOff x="0" y="0"/>
+          <a:chExt cx="0" cy="0"/>
+        </a:xfrm>
+      </p:grpSpPr>
+      <p:sp>
+        <p:nvSpPr>
+          <p:cNvPr id="5" name="Rectangle 4">
+            <a:extLst>
+              <a:ext uri="{FF2B5EF4-FFF2-40B4-BE49-F238E27FC236}">
+                <a16:creationId xmlns:a16="http://schemas.microsoft.com/office/drawing/2014/main" id="{199147EF-1F1C-7740-9E51-D455D81D415E}"/>
+              </a:ext>
+            </a:extLst>
+          </p:cNvPr>
+          <p:cNvSpPr/>
+          <p:nvPr/>
+        </p:nvSpPr>
+        <p:spPr>
+          <a:xfrm>
+            <a:off x="757539" y="1523175"/>
+            <a:ext cx="2517732" cy="2564013"/>
+          </a:xfrm>
+          <a:prstGeom prst="rect">
+            <a:avLst/>
+          </a:prstGeom>
+          <a:solidFill>
+            <a:schemeClr val="bg1">
+              <a:lumMod val="65000"/>
+            </a:schemeClr>
+          </a:solidFill>
+        </p:spPr>
+        <p:style>
+          <a:lnRef idx="2">
+            <a:schemeClr val="accent1">
+              <a:shade val="50000"/>
+            </a:schemeClr>
+          </a:lnRef>
+          <a:fillRef idx="1">
+            <a:schemeClr val="accent1"/>
+          </a:fillRef>
+          <a:effectRef idx="0">
+            <a:schemeClr val="accent1"/>
+          </a:effectRef>
+          <a:fontRef idx="minor">
+            <a:schemeClr val="lt1"/>
+          </a:fontRef>
+        </p:style>
+        <p:txBody>
+          <a:bodyPr rtlCol="0" anchor="t"/>
+          <a:lstStyle/>
+          <a:p>
+            <a:pPr algn="ctr"/>
+            <a:r>
+              <a:rPr lang="en-US" dirty="0"/>
+              <a:t>Virtual Machine</a:t>
+            </a:r>
+          </a:p>
+        </p:txBody>
+      </p:sp>
+      <p:sp>
+        <p:nvSpPr>
+          <p:cNvPr id="7" name="Rectangle 6">
+            <a:extLst>
+              <a:ext uri="{FF2B5EF4-FFF2-40B4-BE49-F238E27FC236}">
+                <a16:creationId xmlns:a16="http://schemas.microsoft.com/office/drawing/2014/main" id="{3F32C1ED-2525-BE4C-A5D0-941F3E42C511}"/>
+              </a:ext>
+            </a:extLst>
+          </p:cNvPr>
+          <p:cNvSpPr/>
+          <p:nvPr/>
+        </p:nvSpPr>
+        <p:spPr>
+          <a:xfrm>
+            <a:off x="1047699" y="3307683"/>
+            <a:ext cx="2025721" cy="582742"/>
+          </a:xfrm>
+          <a:prstGeom prst="rect">
+            <a:avLst/>
+          </a:prstGeom>
+          <a:solidFill>
+            <a:srgbClr val="182F9E"/>
+          </a:solidFill>
+        </p:spPr>
+        <p:style>
+          <a:lnRef idx="2">
+            <a:schemeClr val="accent1">
+              <a:shade val="50000"/>
+            </a:schemeClr>
+          </a:lnRef>
+          <a:fillRef idx="1">
+            <a:schemeClr val="accent1"/>
+          </a:fillRef>
+          <a:effectRef idx="0">
+            <a:schemeClr val="accent1"/>
+          </a:effectRef>
+          <a:fontRef idx="minor">
+            <a:schemeClr val="lt1"/>
+          </a:fontRef>
+        </p:style>
+        <p:txBody>
+          <a:bodyPr rtlCol="0" anchor="ctr"/>
+          <a:lstStyle/>
+          <a:p>
+            <a:pPr algn="ctr"/>
+            <a:r>
+              <a:rPr lang="en-US" dirty="0">
+                <a:solidFill>
+                  <a:schemeClr val="bg1"/>
+                </a:solidFill>
+              </a:rPr>
+              <a:t>./</a:t>
+            </a:r>
+            <a:r>
+              <a:rPr lang="en-US" dirty="0" err="1">
+                <a:solidFill>
+                  <a:schemeClr val="bg1"/>
+                </a:solidFill>
+              </a:rPr>
+              <a:t>sendstats.sh</a:t>
+            </a:r>
+            <a:endParaRPr lang="en-US" dirty="0">
+              <a:solidFill>
+                <a:schemeClr val="bg1"/>
+              </a:solidFill>
+            </a:endParaRPr>
+          </a:p>
+        </p:txBody>
+      </p:sp>
+      <p:sp>
+        <p:nvSpPr>
+          <p:cNvPr id="8" name="Rectangle 7">
+            <a:extLst>
+              <a:ext uri="{FF2B5EF4-FFF2-40B4-BE49-F238E27FC236}">
+                <a16:creationId xmlns:a16="http://schemas.microsoft.com/office/drawing/2014/main" id="{985B0F89-6FC1-9F43-B102-DD589B1479FC}"/>
+              </a:ext>
+            </a:extLst>
+          </p:cNvPr>
+          <p:cNvSpPr/>
+          <p:nvPr/>
+        </p:nvSpPr>
+        <p:spPr>
+          <a:xfrm>
+            <a:off x="10227629" y="1523176"/>
+            <a:ext cx="1696397" cy="2548974"/>
+          </a:xfrm>
+          <a:prstGeom prst="rect">
+            <a:avLst/>
+          </a:prstGeom>
+          <a:solidFill>
+            <a:schemeClr val="accent6"/>
+          </a:solidFill>
+        </p:spPr>
+        <p:style>
+          <a:lnRef idx="2">
+            <a:schemeClr val="accent1">
+              <a:shade val="50000"/>
+            </a:schemeClr>
+          </a:lnRef>
+          <a:fillRef idx="1">
+            <a:schemeClr val="accent1"/>
+          </a:fillRef>
+          <a:effectRef idx="0">
+            <a:schemeClr val="accent1"/>
+          </a:effectRef>
+          <a:fontRef idx="minor">
+            <a:schemeClr val="lt1"/>
+          </a:fontRef>
+        </p:style>
+        <p:txBody>
+          <a:bodyPr rtlCol="0" anchor="t"/>
+          <a:lstStyle/>
+          <a:p>
+            <a:pPr algn="ctr"/>
+            <a:r>
+              <a:rPr lang="en-US" dirty="0"/>
+              <a:t>Dynatrace SaaS</a:t>
+            </a:r>
+          </a:p>
+        </p:txBody>
+      </p:sp>
+      <p:sp>
+        <p:nvSpPr>
+          <p:cNvPr id="10" name="Rectangle 9">
+            <a:extLst>
+              <a:ext uri="{FF2B5EF4-FFF2-40B4-BE49-F238E27FC236}">
+                <a16:creationId xmlns:a16="http://schemas.microsoft.com/office/drawing/2014/main" id="{6223CF53-F7D0-834B-A071-4922A0BA7297}"/>
+              </a:ext>
+            </a:extLst>
+          </p:cNvPr>
+          <p:cNvSpPr/>
+          <p:nvPr/>
+        </p:nvSpPr>
+        <p:spPr>
+          <a:xfrm>
+            <a:off x="6380808" y="1523175"/>
+            <a:ext cx="2150424" cy="2564013"/>
+          </a:xfrm>
+          <a:prstGeom prst="rect">
+            <a:avLst/>
+          </a:prstGeom>
+          <a:solidFill>
+            <a:schemeClr val="bg1">
+              <a:lumMod val="65000"/>
+            </a:schemeClr>
+          </a:solidFill>
+        </p:spPr>
+        <p:style>
+          <a:lnRef idx="2">
+            <a:schemeClr val="accent1">
+              <a:shade val="50000"/>
+            </a:schemeClr>
+          </a:lnRef>
+          <a:fillRef idx="1">
+            <a:schemeClr val="accent1"/>
+          </a:fillRef>
+          <a:effectRef idx="0">
+            <a:schemeClr val="accent1"/>
+          </a:effectRef>
+          <a:fontRef idx="minor">
+            <a:schemeClr val="lt1"/>
+          </a:fontRef>
+        </p:style>
+        <p:txBody>
+          <a:bodyPr rtlCol="0" anchor="t"/>
+          <a:lstStyle/>
+          <a:p>
+            <a:pPr algn="ctr"/>
+            <a:r>
+              <a:rPr lang="en-US" dirty="0"/>
+              <a:t>Virtual Machine</a:t>
+            </a:r>
+          </a:p>
+          <a:p>
+            <a:pPr algn="ctr"/>
+            <a:endParaRPr lang="en-US" dirty="0"/>
+          </a:p>
+        </p:txBody>
+      </p:sp>
+      <p:cxnSp>
+        <p:nvCxnSpPr>
+          <p:cNvPr id="14" name="Straight Arrow Connector 13">
+            <a:extLst>
+              <a:ext uri="{FF2B5EF4-FFF2-40B4-BE49-F238E27FC236}">
+                <a16:creationId xmlns:a16="http://schemas.microsoft.com/office/drawing/2014/main" id="{C4EEFEB7-64F1-FC4E-B467-582D30DD4C36}"/>
+              </a:ext>
+            </a:extLst>
+          </p:cNvPr>
+          <p:cNvCxnSpPr>
+            <a:cxnSpLocks/>
+          </p:cNvCxnSpPr>
+          <p:nvPr/>
+        </p:nvCxnSpPr>
+        <p:spPr>
+          <a:xfrm>
+            <a:off x="3219768" y="3577397"/>
+            <a:ext cx="3161040" cy="1"/>
+          </a:xfrm>
+          <a:prstGeom prst="straightConnector1">
+            <a:avLst/>
+          </a:prstGeom>
+          <a:ln w="76200">
+            <a:solidFill>
+              <a:schemeClr val="accent4"/>
+            </a:solidFill>
+            <a:headEnd type="none"/>
+            <a:tailEnd type="triangle"/>
+          </a:ln>
+        </p:spPr>
+        <p:style>
+          <a:lnRef idx="1">
+            <a:schemeClr val="accent1"/>
+          </a:lnRef>
+          <a:fillRef idx="0">
+            <a:schemeClr val="accent1"/>
+          </a:fillRef>
+          <a:effectRef idx="0">
+            <a:schemeClr val="accent1"/>
+          </a:effectRef>
+          <a:fontRef idx="minor">
+            <a:schemeClr val="tx1"/>
+          </a:fontRef>
+        </p:style>
+      </p:cxnSp>
+      <p:sp>
+        <p:nvSpPr>
+          <p:cNvPr id="22" name="TextBox 21">
+            <a:extLst>
+              <a:ext uri="{FF2B5EF4-FFF2-40B4-BE49-F238E27FC236}">
+                <a16:creationId xmlns:a16="http://schemas.microsoft.com/office/drawing/2014/main" id="{7BC6692B-A95F-F74B-BDE8-0ED06C7B4B08}"/>
+              </a:ext>
+            </a:extLst>
+          </p:cNvPr>
+          <p:cNvSpPr txBox="1"/>
+          <p:nvPr/>
+        </p:nvSpPr>
+        <p:spPr>
+          <a:xfrm>
+            <a:off x="3448346" y="3764022"/>
+            <a:ext cx="2849672" cy="646331"/>
+          </a:xfrm>
+          <a:prstGeom prst="rect">
+            <a:avLst/>
+          </a:prstGeom>
+          <a:noFill/>
+        </p:spPr>
+        <p:txBody>
+          <a:bodyPr wrap="square">
+            <a:spAutoFit/>
+          </a:bodyPr>
+          <a:lstStyle/>
+          <a:p>
+            <a:r>
+              <a:rPr lang="en-US" dirty="0">
+                <a:solidFill>
+                  <a:schemeClr val="tx1"/>
+                </a:solidFill>
+              </a:rPr>
+              <a:t>Send </a:t>
+            </a:r>
+            <a:r>
+              <a:rPr lang="en-US" dirty="0" err="1">
+                <a:solidFill>
+                  <a:schemeClr val="tx1"/>
+                </a:solidFill>
+              </a:rPr>
+              <a:t>StatsD</a:t>
+            </a:r>
+            <a:r>
+              <a:rPr lang="en-US" dirty="0">
+                <a:solidFill>
+                  <a:schemeClr val="tx1"/>
+                </a:solidFill>
+              </a:rPr>
+              <a:t> statistics to Active Gate via port 18126</a:t>
+            </a:r>
+            <a:endParaRPr lang="en-US" dirty="0"/>
+          </a:p>
+        </p:txBody>
+      </p:sp>
+      <p:cxnSp>
+        <p:nvCxnSpPr>
+          <p:cNvPr id="23" name="Straight Arrow Connector 22">
+            <a:extLst>
+              <a:ext uri="{FF2B5EF4-FFF2-40B4-BE49-F238E27FC236}">
+                <a16:creationId xmlns:a16="http://schemas.microsoft.com/office/drawing/2014/main" id="{89802B46-3E68-D345-B183-0615939167C2}"/>
+              </a:ext>
+            </a:extLst>
+          </p:cNvPr>
+          <p:cNvCxnSpPr>
+            <a:cxnSpLocks/>
+          </p:cNvCxnSpPr>
+          <p:nvPr/>
+        </p:nvCxnSpPr>
+        <p:spPr>
+          <a:xfrm>
+            <a:off x="8531231" y="3831366"/>
+            <a:ext cx="1696398" cy="0"/>
+          </a:xfrm>
+          <a:prstGeom prst="straightConnector1">
+            <a:avLst/>
+          </a:prstGeom>
+          <a:ln w="76200">
+            <a:solidFill>
+              <a:schemeClr val="accent4"/>
+            </a:solidFill>
+            <a:headEnd type="none"/>
+            <a:tailEnd type="triangle"/>
+          </a:ln>
+        </p:spPr>
+        <p:style>
+          <a:lnRef idx="1">
+            <a:schemeClr val="accent1"/>
+          </a:lnRef>
+          <a:fillRef idx="0">
+            <a:schemeClr val="accent1"/>
+          </a:fillRef>
+          <a:effectRef idx="0">
+            <a:schemeClr val="accent1"/>
+          </a:effectRef>
+          <a:fontRef idx="minor">
+            <a:schemeClr val="tx1"/>
+          </a:fontRef>
+        </p:style>
+      </p:cxnSp>
+      <p:sp>
+        <p:nvSpPr>
+          <p:cNvPr id="48" name="TextBox 47">
+            <a:extLst>
+              <a:ext uri="{FF2B5EF4-FFF2-40B4-BE49-F238E27FC236}">
+                <a16:creationId xmlns:a16="http://schemas.microsoft.com/office/drawing/2014/main" id="{99D256AA-1663-9647-97C0-C9A3D3E88396}"/>
+              </a:ext>
+            </a:extLst>
+          </p:cNvPr>
+          <p:cNvSpPr txBox="1"/>
+          <p:nvPr/>
+        </p:nvSpPr>
+        <p:spPr>
+          <a:xfrm>
+            <a:off x="8602994" y="2776590"/>
+            <a:ext cx="1667357" cy="923330"/>
+          </a:xfrm>
+          <a:prstGeom prst="rect">
+            <a:avLst/>
+          </a:prstGeom>
+          <a:noFill/>
+        </p:spPr>
+        <p:txBody>
+          <a:bodyPr wrap="square">
+            <a:spAutoFit/>
+          </a:bodyPr>
+          <a:lstStyle/>
+          <a:p>
+            <a:r>
+              <a:rPr lang="en-US" dirty="0">
+                <a:solidFill>
+                  <a:schemeClr val="tx1"/>
+                </a:solidFill>
+              </a:rPr>
+              <a:t>Extension Module sends metrics to DT</a:t>
+            </a:r>
+            <a:endParaRPr lang="en-US" dirty="0"/>
+          </a:p>
+        </p:txBody>
+      </p:sp>
+      <p:sp>
+        <p:nvSpPr>
+          <p:cNvPr id="52" name="Rectangle 51">
+            <a:extLst>
+              <a:ext uri="{FF2B5EF4-FFF2-40B4-BE49-F238E27FC236}">
+                <a16:creationId xmlns:a16="http://schemas.microsoft.com/office/drawing/2014/main" id="{EDE9C07C-A6C4-E248-9CCB-7A29EF8C46BB}"/>
+              </a:ext>
+            </a:extLst>
+          </p:cNvPr>
+          <p:cNvSpPr/>
+          <p:nvPr/>
+        </p:nvSpPr>
+        <p:spPr>
+          <a:xfrm>
+            <a:off x="6527156" y="2594001"/>
+            <a:ext cx="1930297" cy="1362159"/>
+          </a:xfrm>
+          <a:prstGeom prst="rect">
+            <a:avLst/>
+          </a:prstGeom>
+          <a:solidFill>
+            <a:schemeClr val="accent6"/>
+          </a:solidFill>
+        </p:spPr>
+        <p:style>
+          <a:lnRef idx="2">
+            <a:schemeClr val="accent1">
+              <a:shade val="50000"/>
+            </a:schemeClr>
+          </a:lnRef>
+          <a:fillRef idx="1">
+            <a:schemeClr val="accent1"/>
+          </a:fillRef>
+          <a:effectRef idx="0">
+            <a:schemeClr val="accent1"/>
+          </a:effectRef>
+          <a:fontRef idx="minor">
+            <a:schemeClr val="lt1"/>
+          </a:fontRef>
+        </p:style>
+        <p:txBody>
+          <a:bodyPr rtlCol="0" anchor="ctr"/>
+          <a:lstStyle/>
+          <a:p>
+            <a:pPr algn="ctr"/>
+            <a:r>
+              <a:rPr lang="en-US" dirty="0">
+                <a:solidFill>
+                  <a:schemeClr val="bg1"/>
+                </a:solidFill>
+              </a:rPr>
+              <a:t>Dynatrace ActiveGate Extension with </a:t>
+            </a:r>
+            <a:r>
+              <a:rPr lang="en-US" dirty="0" err="1">
+                <a:solidFill>
+                  <a:schemeClr val="bg1"/>
+                </a:solidFill>
+              </a:rPr>
+              <a:t>StatsD</a:t>
+            </a:r>
+            <a:r>
+              <a:rPr lang="en-US" dirty="0">
+                <a:solidFill>
+                  <a:schemeClr val="bg1"/>
+                </a:solidFill>
+              </a:rPr>
+              <a:t> Listener</a:t>
+            </a:r>
+          </a:p>
+        </p:txBody>
+      </p:sp>
+      <p:pic>
+        <p:nvPicPr>
+          <p:cNvPr id="57" name="Picture 56" descr="Icon&#10;&#10;Description automatically generated">
+            <a:extLst>
+              <a:ext uri="{FF2B5EF4-FFF2-40B4-BE49-F238E27FC236}">
+                <a16:creationId xmlns:a16="http://schemas.microsoft.com/office/drawing/2014/main" id="{83AC8199-EF28-BF42-B50C-047FCD640CBA}"/>
+              </a:ext>
+            </a:extLst>
+          </p:cNvPr>
+          <p:cNvPicPr>
+            <a:picLocks noChangeAspect="1"/>
+          </p:cNvPicPr>
+          <p:nvPr/>
+        </p:nvPicPr>
+        <p:blipFill>
+          <a:blip r:embed="rId2"/>
+          <a:stretch>
+            <a:fillRect/>
+          </a:stretch>
+        </p:blipFill>
+        <p:spPr>
+          <a:xfrm>
+            <a:off x="10776436" y="1863834"/>
+            <a:ext cx="598782" cy="598782"/>
+          </a:xfrm>
+          <a:prstGeom prst="rect">
+            <a:avLst/>
+          </a:prstGeom>
+        </p:spPr>
+      </p:pic>
+      <p:pic>
+        <p:nvPicPr>
+          <p:cNvPr id="60" name="Picture 59" descr="Icon&#10;&#10;Description automatically generated">
+            <a:extLst>
+              <a:ext uri="{FF2B5EF4-FFF2-40B4-BE49-F238E27FC236}">
+                <a16:creationId xmlns:a16="http://schemas.microsoft.com/office/drawing/2014/main" id="{3E437A79-9E63-1B40-AC11-0567EA7151A3}"/>
+              </a:ext>
+            </a:extLst>
+          </p:cNvPr>
+          <p:cNvPicPr>
+            <a:picLocks noChangeAspect="1"/>
+          </p:cNvPicPr>
+          <p:nvPr/>
+        </p:nvPicPr>
+        <p:blipFill>
+          <a:blip r:embed="rId2"/>
+          <a:stretch>
+            <a:fillRect/>
+          </a:stretch>
+        </p:blipFill>
+        <p:spPr>
+          <a:xfrm>
+            <a:off x="6575060" y="2615318"/>
+            <a:ext cx="374259" cy="374259"/>
+          </a:xfrm>
+          <a:prstGeom prst="rect">
+            <a:avLst/>
+          </a:prstGeom>
+        </p:spPr>
+      </p:pic>
+      <p:sp>
+        <p:nvSpPr>
+          <p:cNvPr id="62" name="TextBox 61">
+            <a:extLst>
+              <a:ext uri="{FF2B5EF4-FFF2-40B4-BE49-F238E27FC236}">
+                <a16:creationId xmlns:a16="http://schemas.microsoft.com/office/drawing/2014/main" id="{AFE80BC7-5830-AE4B-883C-76A278AD19CD}"/>
+              </a:ext>
+            </a:extLst>
+          </p:cNvPr>
+          <p:cNvSpPr txBox="1"/>
+          <p:nvPr/>
+        </p:nvSpPr>
+        <p:spPr>
+          <a:xfrm>
+            <a:off x="649489" y="370214"/>
+            <a:ext cx="6100174" cy="523220"/>
+          </a:xfrm>
+          <a:prstGeom prst="rect">
+            <a:avLst/>
+          </a:prstGeom>
+          <a:noFill/>
+        </p:spPr>
+        <p:txBody>
+          <a:bodyPr wrap="square">
+            <a:spAutoFit/>
+          </a:bodyPr>
+          <a:lstStyle/>
+          <a:p>
+            <a:r>
+              <a:rPr lang="en-US" sz="2800" b="1" dirty="0" err="1">
+                <a:solidFill>
+                  <a:schemeClr val="tx1"/>
+                </a:solidFill>
+              </a:rPr>
+              <a:t>StatsD</a:t>
+            </a:r>
+            <a:r>
+              <a:rPr lang="en-US" sz="2800" b="1" dirty="0">
+                <a:solidFill>
+                  <a:schemeClr val="tx1"/>
+                </a:solidFill>
+              </a:rPr>
+              <a:t> Metrics</a:t>
+            </a:r>
+            <a:endParaRPr lang="en-US" sz="2800" b="1" dirty="0"/>
+          </a:p>
+        </p:txBody>
+      </p:sp>
+      <p:pic>
+        <p:nvPicPr>
+          <p:cNvPr id="6" name="Picture 5">
+            <a:extLst>
+              <a:ext uri="{FF2B5EF4-FFF2-40B4-BE49-F238E27FC236}">
+                <a16:creationId xmlns:a16="http://schemas.microsoft.com/office/drawing/2014/main" id="{8BBF3E32-40FE-9048-98F1-2FE378B5A286}"/>
+              </a:ext>
+            </a:extLst>
+          </p:cNvPr>
+          <p:cNvPicPr>
+            <a:picLocks noChangeAspect="1"/>
+          </p:cNvPicPr>
+          <p:nvPr/>
+        </p:nvPicPr>
+        <p:blipFill>
+          <a:blip r:embed="rId3"/>
+          <a:stretch>
+            <a:fillRect/>
+          </a:stretch>
+        </p:blipFill>
+        <p:spPr>
+          <a:xfrm>
+            <a:off x="10435932" y="2729714"/>
+            <a:ext cx="1279790" cy="1155939"/>
+          </a:xfrm>
+          <a:prstGeom prst="rect">
+            <a:avLst/>
+          </a:prstGeom>
+        </p:spPr>
+      </p:pic>
+      <p:pic>
+        <p:nvPicPr>
+          <p:cNvPr id="9" name="Picture 8">
+            <a:extLst>
+              <a:ext uri="{FF2B5EF4-FFF2-40B4-BE49-F238E27FC236}">
+                <a16:creationId xmlns:a16="http://schemas.microsoft.com/office/drawing/2014/main" id="{E90647A5-E682-7649-9D15-456D54038FC4}"/>
+              </a:ext>
+            </a:extLst>
+          </p:cNvPr>
+          <p:cNvPicPr>
+            <a:picLocks noChangeAspect="1"/>
+          </p:cNvPicPr>
+          <p:nvPr/>
+        </p:nvPicPr>
+        <p:blipFill>
+          <a:blip r:embed="rId4"/>
+          <a:stretch>
+            <a:fillRect/>
+          </a:stretch>
+        </p:blipFill>
+        <p:spPr>
+          <a:xfrm>
+            <a:off x="3479123" y="4480718"/>
+            <a:ext cx="5233754" cy="1457712"/>
+          </a:xfrm>
+          <a:prstGeom prst="rect">
+            <a:avLst/>
+          </a:prstGeom>
+        </p:spPr>
+      </p:pic>
+    </p:spTree>
+    <p:extLst>
+      <p:ext uri="{BB962C8B-B14F-4D97-AF65-F5344CB8AC3E}">
+        <p14:creationId xmlns:p14="http://schemas.microsoft.com/office/powerpoint/2010/main" val="2672864886"/>
+      </p:ext>
+    </p:extLst>
+  </p:cSld>
+  <p:clrMapOvr>
+    <a:masterClrMapping/>
+  </p:clrMapOvr>
+</p:sld>
+</file>
+
+<file path=ppt/slides/slide6.xml><?xml version="1.0" encoding="utf-8"?>
+<p:sld xmlns:a="http://schemas.openxmlformats.org/drawingml/2006/main" xmlns:r="http://schemas.openxmlformats.org/officeDocument/2006/relationships" xmlns:p="http://schemas.openxmlformats.org/presentationml/2006/main">
+  <p:cSld>
+    <p:spTree>
+      <p:nvGrpSpPr>
+        <p:cNvPr id="1" name=""/>
+        <p:cNvGrpSpPr/>
+        <p:nvPr/>
+      </p:nvGrpSpPr>
+      <p:grpSpPr>
+        <a:xfrm>
+          <a:off x="0" y="0"/>
+          <a:ext cx="0" cy="0"/>
+          <a:chOff x="0" y="0"/>
+          <a:chExt cx="0" cy="0"/>
+        </a:xfrm>
+      </p:grpSpPr>
+      <p:sp>
+        <p:nvSpPr>
+          <p:cNvPr id="31" name="Rectangle 30">
+            <a:extLst>
+              <a:ext uri="{FF2B5EF4-FFF2-40B4-BE49-F238E27FC236}">
+                <a16:creationId xmlns:a16="http://schemas.microsoft.com/office/drawing/2014/main" id="{03F8F137-48EC-C44C-B13A-262542A6AAAF}"/>
+              </a:ext>
+            </a:extLst>
+          </p:cNvPr>
+          <p:cNvSpPr/>
+          <p:nvPr/>
+        </p:nvSpPr>
+        <p:spPr>
+          <a:xfrm>
+            <a:off x="1398810" y="1621839"/>
+            <a:ext cx="2517732" cy="3194580"/>
+          </a:xfrm>
+          <a:prstGeom prst="rect">
+            <a:avLst/>
+          </a:prstGeom>
+          <a:solidFill>
+            <a:schemeClr val="bg1">
+              <a:lumMod val="65000"/>
+            </a:schemeClr>
+          </a:solidFill>
+        </p:spPr>
+        <p:style>
+          <a:lnRef idx="2">
+            <a:schemeClr val="accent1">
+              <a:shade val="50000"/>
+            </a:schemeClr>
+          </a:lnRef>
+          <a:fillRef idx="1">
+            <a:schemeClr val="accent1"/>
+          </a:fillRef>
+          <a:effectRef idx="0">
+            <a:schemeClr val="accent1"/>
+          </a:effectRef>
+          <a:fontRef idx="minor">
+            <a:schemeClr val="lt1"/>
+          </a:fontRef>
+        </p:style>
+        <p:txBody>
+          <a:bodyPr rtlCol="0" anchor="t"/>
+          <a:lstStyle/>
+          <a:p>
+            <a:pPr algn="ctr"/>
+            <a:r>
+              <a:rPr lang="en-US" dirty="0"/>
+              <a:t>Virtual Machine</a:t>
+            </a:r>
+          </a:p>
+        </p:txBody>
+      </p:sp>
+      <p:sp>
+        <p:nvSpPr>
+          <p:cNvPr id="34" name="Rectangle 33">
+            <a:extLst>
+              <a:ext uri="{FF2B5EF4-FFF2-40B4-BE49-F238E27FC236}">
+                <a16:creationId xmlns:a16="http://schemas.microsoft.com/office/drawing/2014/main" id="{D5251B5F-D7BC-604B-AC82-D8CBCB1992E1}"/>
+              </a:ext>
+            </a:extLst>
+          </p:cNvPr>
+          <p:cNvSpPr/>
+          <p:nvPr/>
+        </p:nvSpPr>
+        <p:spPr>
+          <a:xfrm>
+            <a:off x="1687001" y="3493494"/>
+            <a:ext cx="1983535" cy="1267108"/>
+          </a:xfrm>
+          <a:prstGeom prst="rect">
+            <a:avLst/>
+          </a:prstGeom>
+          <a:solidFill>
+            <a:schemeClr val="accent6"/>
+          </a:solidFill>
+        </p:spPr>
+        <p:style>
+          <a:lnRef idx="2">
+            <a:schemeClr val="accent1">
+              <a:shade val="50000"/>
+            </a:schemeClr>
+          </a:lnRef>
+          <a:fillRef idx="1">
+            <a:schemeClr val="accent1"/>
+          </a:fillRef>
+          <a:effectRef idx="0">
+            <a:schemeClr val="accent1"/>
+          </a:effectRef>
+          <a:fontRef idx="minor">
+            <a:schemeClr val="lt1"/>
+          </a:fontRef>
+        </p:style>
+        <p:txBody>
+          <a:bodyPr rtlCol="0" anchor="ctr"/>
+          <a:lstStyle/>
+          <a:p>
+            <a:pPr algn="ctr"/>
+            <a:r>
+              <a:rPr lang="en-US" dirty="0"/>
+              <a:t>Dynatrace OneAgent </a:t>
+            </a:r>
+            <a:r>
+              <a:rPr lang="en-US" dirty="0">
+                <a:solidFill>
+                  <a:schemeClr val="bg1"/>
+                </a:solidFill>
+              </a:rPr>
+              <a:t>with </a:t>
+            </a:r>
+            <a:r>
+              <a:rPr lang="en-US" dirty="0" err="1">
+                <a:solidFill>
+                  <a:schemeClr val="bg1"/>
+                </a:solidFill>
+              </a:rPr>
+              <a:t>StatsD</a:t>
+            </a:r>
+            <a:r>
+              <a:rPr lang="en-US" dirty="0">
+                <a:solidFill>
+                  <a:schemeClr val="bg1"/>
+                </a:solidFill>
+              </a:rPr>
+              <a:t> Listener enabled</a:t>
+            </a:r>
+            <a:endParaRPr lang="en-US" dirty="0"/>
+          </a:p>
+        </p:txBody>
+      </p:sp>
+      <p:cxnSp>
+        <p:nvCxnSpPr>
+          <p:cNvPr id="38" name="Straight Arrow Connector 37">
+            <a:extLst>
+              <a:ext uri="{FF2B5EF4-FFF2-40B4-BE49-F238E27FC236}">
+                <a16:creationId xmlns:a16="http://schemas.microsoft.com/office/drawing/2014/main" id="{D31912C0-F1DC-F24B-B420-ED2D621D00D8}"/>
+              </a:ext>
+            </a:extLst>
+          </p:cNvPr>
+          <p:cNvCxnSpPr>
+            <a:cxnSpLocks/>
+          </p:cNvCxnSpPr>
+          <p:nvPr/>
+        </p:nvCxnSpPr>
+        <p:spPr>
+          <a:xfrm flipV="1">
+            <a:off x="3670536" y="4406834"/>
+            <a:ext cx="4452158" cy="13740"/>
+          </a:xfrm>
+          <a:prstGeom prst="straightConnector1">
+            <a:avLst/>
+          </a:prstGeom>
+          <a:ln w="76200">
+            <a:solidFill>
+              <a:schemeClr val="accent4"/>
+            </a:solidFill>
+            <a:headEnd type="none"/>
+            <a:tailEnd type="triangle"/>
+          </a:ln>
+        </p:spPr>
+        <p:style>
+          <a:lnRef idx="1">
+            <a:schemeClr val="accent1"/>
+          </a:lnRef>
+          <a:fillRef idx="0">
+            <a:schemeClr val="accent1"/>
+          </a:fillRef>
+          <a:effectRef idx="0">
+            <a:schemeClr val="accent1"/>
+          </a:effectRef>
+          <a:fontRef idx="minor">
+            <a:schemeClr val="tx1"/>
+          </a:fontRef>
+        </p:style>
+      </p:cxnSp>
+      <p:pic>
+        <p:nvPicPr>
+          <p:cNvPr id="59" name="Picture 58" descr="Icon&#10;&#10;Description automatically generated">
+            <a:extLst>
+              <a:ext uri="{FF2B5EF4-FFF2-40B4-BE49-F238E27FC236}">
+                <a16:creationId xmlns:a16="http://schemas.microsoft.com/office/drawing/2014/main" id="{F5CA1984-5784-C345-8463-86ED67C558CB}"/>
+              </a:ext>
+            </a:extLst>
+          </p:cNvPr>
+          <p:cNvPicPr>
+            <a:picLocks noChangeAspect="1"/>
+          </p:cNvPicPr>
+          <p:nvPr/>
+        </p:nvPicPr>
+        <p:blipFill>
+          <a:blip r:embed="rId2"/>
+          <a:stretch>
+            <a:fillRect/>
+          </a:stretch>
+        </p:blipFill>
+        <p:spPr>
+          <a:xfrm>
+            <a:off x="1687001" y="3506050"/>
+            <a:ext cx="374259" cy="374259"/>
+          </a:xfrm>
+          <a:prstGeom prst="rect">
+            <a:avLst/>
+          </a:prstGeom>
+        </p:spPr>
+      </p:pic>
+      <p:sp>
+        <p:nvSpPr>
+          <p:cNvPr id="63" name="TextBox 62">
+            <a:extLst>
+              <a:ext uri="{FF2B5EF4-FFF2-40B4-BE49-F238E27FC236}">
+                <a16:creationId xmlns:a16="http://schemas.microsoft.com/office/drawing/2014/main" id="{3785A943-E0F2-7D4D-9B20-88A26E8A4B43}"/>
+              </a:ext>
+            </a:extLst>
+          </p:cNvPr>
+          <p:cNvSpPr txBox="1"/>
+          <p:nvPr/>
+        </p:nvSpPr>
+        <p:spPr>
+          <a:xfrm>
+            <a:off x="649489" y="370214"/>
+            <a:ext cx="6100174" cy="523220"/>
+          </a:xfrm>
+          <a:prstGeom prst="rect">
+            <a:avLst/>
+          </a:prstGeom>
+          <a:noFill/>
+        </p:spPr>
+        <p:txBody>
+          <a:bodyPr wrap="square">
+            <a:spAutoFit/>
+          </a:bodyPr>
+          <a:lstStyle/>
+          <a:p>
+            <a:r>
+              <a:rPr lang="en-US" sz="2800" b="1" dirty="0">
+                <a:solidFill>
+                  <a:schemeClr val="tx1"/>
+                </a:solidFill>
+              </a:rPr>
+              <a:t>Application Logs</a:t>
+            </a:r>
+            <a:endParaRPr lang="en-US" sz="2800" b="1" dirty="0"/>
+          </a:p>
+        </p:txBody>
+      </p:sp>
+      <p:sp>
+        <p:nvSpPr>
+          <p:cNvPr id="64" name="Rectangle 63">
+            <a:extLst>
+              <a:ext uri="{FF2B5EF4-FFF2-40B4-BE49-F238E27FC236}">
+                <a16:creationId xmlns:a16="http://schemas.microsoft.com/office/drawing/2014/main" id="{909BB081-BF70-624B-A8D4-60BC1E0618EE}"/>
+              </a:ext>
+            </a:extLst>
+          </p:cNvPr>
+          <p:cNvSpPr/>
+          <p:nvPr/>
+        </p:nvSpPr>
+        <p:spPr>
+          <a:xfrm>
+            <a:off x="8122694" y="1517831"/>
+            <a:ext cx="1696397" cy="3298587"/>
+          </a:xfrm>
+          <a:prstGeom prst="rect">
+            <a:avLst/>
+          </a:prstGeom>
+          <a:solidFill>
+            <a:schemeClr val="accent6"/>
+          </a:solidFill>
+        </p:spPr>
+        <p:style>
+          <a:lnRef idx="2">
+            <a:schemeClr val="accent1">
+              <a:shade val="50000"/>
+            </a:schemeClr>
+          </a:lnRef>
+          <a:fillRef idx="1">
+            <a:schemeClr val="accent1"/>
+          </a:fillRef>
+          <a:effectRef idx="0">
+            <a:schemeClr val="accent1"/>
+          </a:effectRef>
+          <a:fontRef idx="minor">
+            <a:schemeClr val="lt1"/>
+          </a:fontRef>
+        </p:style>
+        <p:txBody>
+          <a:bodyPr rtlCol="0" anchor="t"/>
+          <a:lstStyle/>
+          <a:p>
+            <a:pPr algn="ctr"/>
+            <a:r>
+              <a:rPr lang="en-US" dirty="0"/>
+              <a:t>Dynatrace SaaS</a:t>
+            </a:r>
+          </a:p>
+        </p:txBody>
+      </p:sp>
+      <p:pic>
+        <p:nvPicPr>
+          <p:cNvPr id="65" name="Picture 64" descr="Icon&#10;&#10;Description automatically generated">
+            <a:extLst>
+              <a:ext uri="{FF2B5EF4-FFF2-40B4-BE49-F238E27FC236}">
+                <a16:creationId xmlns:a16="http://schemas.microsoft.com/office/drawing/2014/main" id="{952B471A-943B-DD40-9823-B9DB17CACAFB}"/>
+              </a:ext>
+            </a:extLst>
+          </p:cNvPr>
+          <p:cNvPicPr>
+            <a:picLocks noChangeAspect="1"/>
+          </p:cNvPicPr>
+          <p:nvPr/>
+        </p:nvPicPr>
+        <p:blipFill>
+          <a:blip r:embed="rId2"/>
+          <a:stretch>
+            <a:fillRect/>
+          </a:stretch>
+        </p:blipFill>
+        <p:spPr>
+          <a:xfrm>
+            <a:off x="8671501" y="1858490"/>
+            <a:ext cx="598782" cy="598782"/>
+          </a:xfrm>
+          <a:prstGeom prst="rect">
+            <a:avLst/>
+          </a:prstGeom>
+        </p:spPr>
+      </p:pic>
+      <p:pic>
+        <p:nvPicPr>
+          <p:cNvPr id="66" name="Picture 65">
+            <a:extLst>
+              <a:ext uri="{FF2B5EF4-FFF2-40B4-BE49-F238E27FC236}">
+                <a16:creationId xmlns:a16="http://schemas.microsoft.com/office/drawing/2014/main" id="{4B5DD838-34DB-1C4F-9656-29537BD86BB3}"/>
+              </a:ext>
+            </a:extLst>
+          </p:cNvPr>
+          <p:cNvPicPr>
+            <a:picLocks noChangeAspect="1"/>
+          </p:cNvPicPr>
+          <p:nvPr/>
+        </p:nvPicPr>
+        <p:blipFill>
+          <a:blip r:embed="rId3"/>
+          <a:stretch>
+            <a:fillRect/>
+          </a:stretch>
+        </p:blipFill>
+        <p:spPr>
+          <a:xfrm>
+            <a:off x="8330997" y="2724370"/>
+            <a:ext cx="1279790" cy="1155939"/>
+          </a:xfrm>
+          <a:prstGeom prst="rect">
+            <a:avLst/>
+          </a:prstGeom>
+        </p:spPr>
+      </p:pic>
+      <p:sp>
+        <p:nvSpPr>
+          <p:cNvPr id="18" name="Rectangle 17">
+            <a:extLst>
+              <a:ext uri="{FF2B5EF4-FFF2-40B4-BE49-F238E27FC236}">
+                <a16:creationId xmlns:a16="http://schemas.microsoft.com/office/drawing/2014/main" id="{2E16D0AD-0300-8C48-877D-6B175E943251}"/>
+              </a:ext>
+            </a:extLst>
+          </p:cNvPr>
+          <p:cNvSpPr/>
+          <p:nvPr/>
+        </p:nvSpPr>
+        <p:spPr>
+          <a:xfrm>
+            <a:off x="1644745" y="2123324"/>
+            <a:ext cx="2025721" cy="502434"/>
+          </a:xfrm>
+          <a:prstGeom prst="rect">
+            <a:avLst/>
+          </a:prstGeom>
+          <a:solidFill>
+            <a:srgbClr val="182F9E"/>
+          </a:solidFill>
+        </p:spPr>
+        <p:style>
+          <a:lnRef idx="2">
+            <a:schemeClr val="accent1">
+              <a:shade val="50000"/>
+            </a:schemeClr>
+          </a:lnRef>
+          <a:fillRef idx="1">
+            <a:schemeClr val="accent1"/>
+          </a:fillRef>
+          <a:effectRef idx="0">
+            <a:schemeClr val="accent1"/>
+          </a:effectRef>
+          <a:fontRef idx="minor">
+            <a:schemeClr val="lt1"/>
+          </a:fontRef>
+        </p:style>
+        <p:txBody>
+          <a:bodyPr rtlCol="0" anchor="ctr"/>
+          <a:lstStyle/>
+          <a:p>
+            <a:pPr algn="ctr"/>
+            <a:r>
+              <a:rPr lang="en-US" dirty="0">
+                <a:solidFill>
+                  <a:schemeClr val="bg1"/>
+                </a:solidFill>
+              </a:rPr>
+              <a:t>./</a:t>
+            </a:r>
+            <a:r>
+              <a:rPr lang="en-US" dirty="0" err="1">
+                <a:solidFill>
+                  <a:schemeClr val="bg1"/>
+                </a:solidFill>
+              </a:rPr>
+              <a:t>sendstats.sh</a:t>
+            </a:r>
+            <a:endParaRPr lang="en-US" dirty="0">
+              <a:solidFill>
+                <a:schemeClr val="bg1"/>
+              </a:solidFill>
+            </a:endParaRPr>
+          </a:p>
+        </p:txBody>
+      </p:sp>
+      <p:cxnSp>
+        <p:nvCxnSpPr>
+          <p:cNvPr id="19" name="Straight Arrow Connector 18">
+            <a:extLst>
+              <a:ext uri="{FF2B5EF4-FFF2-40B4-BE49-F238E27FC236}">
+                <a16:creationId xmlns:a16="http://schemas.microsoft.com/office/drawing/2014/main" id="{8C6206F0-3A6F-AC44-84F1-5776879A9007}"/>
+              </a:ext>
+            </a:extLst>
+          </p:cNvPr>
+          <p:cNvCxnSpPr>
+            <a:cxnSpLocks/>
+          </p:cNvCxnSpPr>
+          <p:nvPr/>
+        </p:nvCxnSpPr>
+        <p:spPr>
+          <a:xfrm>
+            <a:off x="2162311" y="2724370"/>
+            <a:ext cx="0" cy="746246"/>
+          </a:xfrm>
+          <a:prstGeom prst="straightConnector1">
+            <a:avLst/>
+          </a:prstGeom>
+          <a:ln w="76200">
+            <a:solidFill>
+              <a:schemeClr val="accent4"/>
+            </a:solidFill>
+            <a:headEnd type="none"/>
+            <a:tailEnd type="triangle"/>
+          </a:ln>
+        </p:spPr>
+        <p:style>
+          <a:lnRef idx="1">
+            <a:schemeClr val="accent1"/>
+          </a:lnRef>
+          <a:fillRef idx="0">
+            <a:schemeClr val="accent1"/>
+          </a:fillRef>
+          <a:effectRef idx="0">
+            <a:schemeClr val="accent1"/>
+          </a:effectRef>
+          <a:fontRef idx="minor">
+            <a:schemeClr val="tx1"/>
+          </a:fontRef>
+        </p:style>
+      </p:cxnSp>
+      <p:sp>
+        <p:nvSpPr>
+          <p:cNvPr id="20" name="TextBox 19">
+            <a:extLst>
+              <a:ext uri="{FF2B5EF4-FFF2-40B4-BE49-F238E27FC236}">
+                <a16:creationId xmlns:a16="http://schemas.microsoft.com/office/drawing/2014/main" id="{1A7D179E-0CEA-2B49-B735-6FF0AB690E07}"/>
+              </a:ext>
+            </a:extLst>
+          </p:cNvPr>
+          <p:cNvSpPr txBox="1"/>
+          <p:nvPr/>
+        </p:nvSpPr>
+        <p:spPr>
+          <a:xfrm>
+            <a:off x="2370615" y="2625758"/>
+            <a:ext cx="1696396" cy="830997"/>
+          </a:xfrm>
+          <a:prstGeom prst="rect">
+            <a:avLst/>
+          </a:prstGeom>
+          <a:noFill/>
+        </p:spPr>
+        <p:txBody>
+          <a:bodyPr wrap="square">
+            <a:spAutoFit/>
+          </a:bodyPr>
+          <a:lstStyle/>
+          <a:p>
+            <a:r>
+              <a:rPr lang="en-US" sz="1600" dirty="0">
+                <a:solidFill>
+                  <a:schemeClr val="tx1"/>
+                </a:solidFill>
+              </a:rPr>
+              <a:t>Send </a:t>
+            </a:r>
+            <a:r>
+              <a:rPr lang="en-US" sz="1600" dirty="0" err="1">
+                <a:solidFill>
+                  <a:schemeClr val="tx1"/>
+                </a:solidFill>
+              </a:rPr>
+              <a:t>StatsD</a:t>
+            </a:r>
+            <a:r>
+              <a:rPr lang="en-US" sz="1600" dirty="0">
+                <a:solidFill>
+                  <a:schemeClr val="tx1"/>
+                </a:solidFill>
+              </a:rPr>
+              <a:t> statistics to port 18125</a:t>
+            </a:r>
+            <a:endParaRPr lang="en-US" sz="1600" dirty="0"/>
+          </a:p>
+        </p:txBody>
+      </p:sp>
+      <p:sp>
+        <p:nvSpPr>
+          <p:cNvPr id="21" name="TextBox 20">
+            <a:extLst>
+              <a:ext uri="{FF2B5EF4-FFF2-40B4-BE49-F238E27FC236}">
+                <a16:creationId xmlns:a16="http://schemas.microsoft.com/office/drawing/2014/main" id="{C81EA123-EAA2-5E4C-AB5D-0F886E2EBAD6}"/>
+              </a:ext>
+            </a:extLst>
+          </p:cNvPr>
+          <p:cNvSpPr txBox="1"/>
+          <p:nvPr/>
+        </p:nvSpPr>
+        <p:spPr>
+          <a:xfrm>
+            <a:off x="4612042" y="3687823"/>
+            <a:ext cx="2969231" cy="646331"/>
+          </a:xfrm>
+          <a:prstGeom prst="rect">
+            <a:avLst/>
+          </a:prstGeom>
+          <a:noFill/>
+        </p:spPr>
+        <p:txBody>
+          <a:bodyPr wrap="square">
+            <a:spAutoFit/>
+          </a:bodyPr>
+          <a:lstStyle/>
+          <a:p>
+            <a:r>
+              <a:rPr lang="en-US" dirty="0">
+                <a:solidFill>
+                  <a:schemeClr val="tx1"/>
+                </a:solidFill>
+              </a:rPr>
+              <a:t>Extension Module sends metrics to DT</a:t>
+            </a:r>
+            <a:endParaRPr lang="en-US" dirty="0"/>
+          </a:p>
+        </p:txBody>
+      </p:sp>
+      <p:pic>
+        <p:nvPicPr>
+          <p:cNvPr id="3" name="Picture 2">
+            <a:extLst>
+              <a:ext uri="{FF2B5EF4-FFF2-40B4-BE49-F238E27FC236}">
+                <a16:creationId xmlns:a16="http://schemas.microsoft.com/office/drawing/2014/main" id="{F12183CD-0BCA-944A-B78D-68685604179B}"/>
+              </a:ext>
+            </a:extLst>
+          </p:cNvPr>
+          <p:cNvPicPr>
+            <a:picLocks noChangeAspect="1"/>
+          </p:cNvPicPr>
+          <p:nvPr/>
+        </p:nvPicPr>
+        <p:blipFill>
+          <a:blip r:embed="rId4"/>
+          <a:stretch>
+            <a:fillRect/>
+          </a:stretch>
+        </p:blipFill>
+        <p:spPr>
+          <a:xfrm>
+            <a:off x="6126935" y="4420574"/>
+            <a:ext cx="4506930" cy="1905338"/>
+          </a:xfrm>
+          <a:prstGeom prst="rect">
+            <a:avLst/>
+          </a:prstGeom>
+        </p:spPr>
+      </p:pic>
+    </p:spTree>
+    <p:extLst>
+      <p:ext uri="{BB962C8B-B14F-4D97-AF65-F5344CB8AC3E}">
+        <p14:creationId xmlns:p14="http://schemas.microsoft.com/office/powerpoint/2010/main" val="1873808102"/>
+      </p:ext>
+    </p:extLst>
+  </p:cSld>
+  <p:clrMapOvr>
+    <a:masterClrMapping/>
+  </p:clrMapOvr>
+</p:sld>
+</file>
+
+<file path=ppt/slides/slide7.xml><?xml version="1.0" encoding="utf-8"?>
+<p:sld xmlns:a="http://schemas.openxmlformats.org/drawingml/2006/main" xmlns:r="http://schemas.openxmlformats.org/officeDocument/2006/relationships" xmlns:p="http://schemas.openxmlformats.org/presentationml/2006/main">
+  <p:cSld>
+    <p:spTree>
+      <p:nvGrpSpPr>
+        <p:cNvPr id="1" name=""/>
+        <p:cNvGrpSpPr/>
+        <p:nvPr/>
+      </p:nvGrpSpPr>
+      <p:grpSpPr>
+        <a:xfrm>
+          <a:off x="0" y="0"/>
+          <a:ext cx="0" cy="0"/>
+          <a:chOff x="0" y="0"/>
+          <a:chExt cx="0" cy="0"/>
+        </a:xfrm>
+      </p:grpSpPr>
+      <p:sp>
+        <p:nvSpPr>
+          <p:cNvPr id="31" name="Rectangle 30">
+            <a:extLst>
+              <a:ext uri="{FF2B5EF4-FFF2-40B4-BE49-F238E27FC236}">
+                <a16:creationId xmlns:a16="http://schemas.microsoft.com/office/drawing/2014/main" id="{03F8F137-48EC-C44C-B13A-262542A6AAAF}"/>
+              </a:ext>
+            </a:extLst>
+          </p:cNvPr>
+          <p:cNvSpPr/>
+          <p:nvPr/>
+        </p:nvSpPr>
+        <p:spPr>
+          <a:xfrm>
+            <a:off x="1792693" y="1495111"/>
+            <a:ext cx="2517732" cy="3901642"/>
+          </a:xfrm>
+          <a:prstGeom prst="rect">
+            <a:avLst/>
+          </a:prstGeom>
+          <a:solidFill>
+            <a:schemeClr val="bg1">
+              <a:lumMod val="65000"/>
+            </a:schemeClr>
+          </a:solidFill>
+        </p:spPr>
+        <p:style>
+          <a:lnRef idx="2">
+            <a:schemeClr val="accent1">
+              <a:shade val="50000"/>
+            </a:schemeClr>
+          </a:lnRef>
+          <a:fillRef idx="1">
+            <a:schemeClr val="accent1"/>
+          </a:fillRef>
+          <a:effectRef idx="0">
+            <a:schemeClr val="accent1"/>
+          </a:effectRef>
+          <a:fontRef idx="minor">
+            <a:schemeClr val="lt1"/>
+          </a:fontRef>
+        </p:style>
+        <p:txBody>
+          <a:bodyPr rtlCol="0" anchor="t"/>
+          <a:lstStyle/>
+          <a:p>
+            <a:pPr algn="ctr"/>
+            <a:r>
+              <a:rPr lang="en-US" dirty="0"/>
+              <a:t>Virtual Machine</a:t>
+            </a:r>
+          </a:p>
+        </p:txBody>
+      </p:sp>
+      <p:sp>
+        <p:nvSpPr>
+          <p:cNvPr id="39" name="Rectangle 38">
+            <a:extLst>
+              <a:ext uri="{FF2B5EF4-FFF2-40B4-BE49-F238E27FC236}">
+                <a16:creationId xmlns:a16="http://schemas.microsoft.com/office/drawing/2014/main" id="{212B64C5-2158-1945-AD85-BC94E81A3A5A}"/>
+              </a:ext>
+            </a:extLst>
+          </p:cNvPr>
+          <p:cNvSpPr/>
+          <p:nvPr/>
+        </p:nvSpPr>
+        <p:spPr>
+          <a:xfrm>
+            <a:off x="2080884" y="3142162"/>
+            <a:ext cx="1983535" cy="435486"/>
+          </a:xfrm>
+          <a:prstGeom prst="rect">
+            <a:avLst/>
+          </a:prstGeom>
+          <a:solidFill>
+            <a:srgbClr val="182F9E"/>
+          </a:solidFill>
+        </p:spPr>
+        <p:style>
+          <a:lnRef idx="2">
+            <a:schemeClr val="accent1">
+              <a:shade val="50000"/>
+            </a:schemeClr>
+          </a:lnRef>
+          <a:fillRef idx="1">
+            <a:schemeClr val="accent1"/>
+          </a:fillRef>
+          <a:effectRef idx="0">
+            <a:schemeClr val="accent1"/>
+          </a:effectRef>
+          <a:fontRef idx="minor">
+            <a:schemeClr val="lt1"/>
+          </a:fontRef>
+        </p:style>
+        <p:txBody>
+          <a:bodyPr rtlCol="0" anchor="ctr"/>
+          <a:lstStyle/>
+          <a:p>
+            <a:pPr algn="ctr"/>
+            <a:r>
+              <a:rPr lang="en-US" dirty="0" err="1">
+                <a:solidFill>
+                  <a:schemeClr val="bg1"/>
+                </a:solidFill>
+              </a:rPr>
+              <a:t>logapp.log</a:t>
+            </a:r>
+            <a:endParaRPr lang="en-US" dirty="0">
+              <a:solidFill>
+                <a:schemeClr val="bg1"/>
+              </a:solidFill>
+            </a:endParaRPr>
+          </a:p>
+        </p:txBody>
+      </p:sp>
+      <p:cxnSp>
+        <p:nvCxnSpPr>
+          <p:cNvPr id="40" name="Straight Arrow Connector 39">
+            <a:extLst>
+              <a:ext uri="{FF2B5EF4-FFF2-40B4-BE49-F238E27FC236}">
+                <a16:creationId xmlns:a16="http://schemas.microsoft.com/office/drawing/2014/main" id="{3E76A806-7FC4-F445-A01B-408AE9F7E7B0}"/>
+              </a:ext>
+            </a:extLst>
+          </p:cNvPr>
+          <p:cNvCxnSpPr>
+            <a:cxnSpLocks/>
+          </p:cNvCxnSpPr>
+          <p:nvPr/>
+        </p:nvCxnSpPr>
+        <p:spPr>
+          <a:xfrm>
+            <a:off x="3076610" y="2742018"/>
+            <a:ext cx="0" cy="404421"/>
+          </a:xfrm>
+          <a:prstGeom prst="straightConnector1">
+            <a:avLst/>
+          </a:prstGeom>
+          <a:ln w="76200">
+            <a:solidFill>
+              <a:schemeClr val="accent4"/>
+            </a:solidFill>
+            <a:headEnd type="none"/>
+            <a:tailEnd type="triangle"/>
+          </a:ln>
+        </p:spPr>
+        <p:style>
+          <a:lnRef idx="1">
+            <a:schemeClr val="accent1"/>
+          </a:lnRef>
+          <a:fillRef idx="0">
+            <a:schemeClr val="accent1"/>
+          </a:fillRef>
+          <a:effectRef idx="0">
+            <a:schemeClr val="accent1"/>
+          </a:effectRef>
+          <a:fontRef idx="minor">
+            <a:schemeClr val="tx1"/>
+          </a:fontRef>
+        </p:style>
+      </p:cxnSp>
+      <p:pic>
+        <p:nvPicPr>
+          <p:cNvPr id="42" name="Picture 41">
+            <a:extLst>
+              <a:ext uri="{FF2B5EF4-FFF2-40B4-BE49-F238E27FC236}">
+                <a16:creationId xmlns:a16="http://schemas.microsoft.com/office/drawing/2014/main" id="{BB18623B-1626-E742-9A36-CE672456D496}"/>
+              </a:ext>
+            </a:extLst>
+          </p:cNvPr>
+          <p:cNvPicPr>
+            <a:picLocks noChangeAspect="1"/>
+          </p:cNvPicPr>
+          <p:nvPr/>
+        </p:nvPicPr>
+        <p:blipFill>
+          <a:blip r:embed="rId2"/>
+          <a:stretch>
+            <a:fillRect/>
+          </a:stretch>
+        </p:blipFill>
+        <p:spPr>
+          <a:xfrm>
+            <a:off x="2857212" y="3622238"/>
+            <a:ext cx="469900" cy="647700"/>
+          </a:xfrm>
+          <a:prstGeom prst="rect">
+            <a:avLst/>
+          </a:prstGeom>
+        </p:spPr>
+      </p:pic>
+      <p:sp>
+        <p:nvSpPr>
+          <p:cNvPr id="45" name="TextBox 44">
+            <a:extLst>
+              <a:ext uri="{FF2B5EF4-FFF2-40B4-BE49-F238E27FC236}">
+                <a16:creationId xmlns:a16="http://schemas.microsoft.com/office/drawing/2014/main" id="{F8397367-578F-5740-BDF3-4A9E35CC7430}"/>
+              </a:ext>
+            </a:extLst>
+          </p:cNvPr>
+          <p:cNvSpPr txBox="1"/>
+          <p:nvPr/>
+        </p:nvSpPr>
+        <p:spPr>
+          <a:xfrm>
+            <a:off x="6249815" y="-1601359"/>
+            <a:ext cx="3831004" cy="369332"/>
+          </a:xfrm>
+          <a:prstGeom prst="rect">
+            <a:avLst/>
+          </a:prstGeom>
+          <a:noFill/>
+        </p:spPr>
+        <p:txBody>
+          <a:bodyPr wrap="square">
+            <a:spAutoFit/>
+          </a:bodyPr>
+          <a:lstStyle/>
+          <a:p>
+            <a:r>
+              <a:rPr lang="en-US" dirty="0">
+                <a:solidFill>
+                  <a:schemeClr val="tx1"/>
+                </a:solidFill>
+              </a:rPr>
+              <a:t>Log Ingest API</a:t>
+            </a:r>
+            <a:endParaRPr lang="en-US" dirty="0"/>
+          </a:p>
+        </p:txBody>
+      </p:sp>
+      <p:sp>
+        <p:nvSpPr>
+          <p:cNvPr id="51" name="Rectangle 50">
+            <a:extLst>
+              <a:ext uri="{FF2B5EF4-FFF2-40B4-BE49-F238E27FC236}">
+                <a16:creationId xmlns:a16="http://schemas.microsoft.com/office/drawing/2014/main" id="{0241D6B9-F6E0-EE44-B9B9-D85E2FE28F2D}"/>
+              </a:ext>
+            </a:extLst>
+          </p:cNvPr>
+          <p:cNvSpPr/>
+          <p:nvPr/>
+        </p:nvSpPr>
+        <p:spPr>
+          <a:xfrm>
+            <a:off x="2103156" y="1967646"/>
+            <a:ext cx="2025721" cy="868687"/>
+          </a:xfrm>
+          <a:prstGeom prst="rect">
+            <a:avLst/>
+          </a:prstGeom>
+          <a:solidFill>
+            <a:srgbClr val="182F9E"/>
+          </a:solidFill>
+        </p:spPr>
+        <p:style>
+          <a:lnRef idx="2">
+            <a:schemeClr val="accent1">
+              <a:shade val="50000"/>
+            </a:schemeClr>
+          </a:lnRef>
+          <a:fillRef idx="1">
+            <a:schemeClr val="accent1"/>
+          </a:fillRef>
+          <a:effectRef idx="0">
+            <a:schemeClr val="accent1"/>
+          </a:effectRef>
+          <a:fontRef idx="minor">
+            <a:schemeClr val="lt1"/>
+          </a:fontRef>
+        </p:style>
+        <p:txBody>
+          <a:bodyPr rtlCol="0" anchor="ctr"/>
+          <a:lstStyle/>
+          <a:p>
+            <a:pPr algn="ctr"/>
+            <a:r>
+              <a:rPr lang="en-US" dirty="0">
+                <a:solidFill>
+                  <a:schemeClr val="bg1"/>
+                </a:solidFill>
+              </a:rPr>
+              <a:t>Node Log App</a:t>
+            </a:r>
+          </a:p>
+        </p:txBody>
+      </p:sp>
+      <p:sp>
+        <p:nvSpPr>
+          <p:cNvPr id="63" name="TextBox 62">
+            <a:extLst>
+              <a:ext uri="{FF2B5EF4-FFF2-40B4-BE49-F238E27FC236}">
+                <a16:creationId xmlns:a16="http://schemas.microsoft.com/office/drawing/2014/main" id="{3785A943-E0F2-7D4D-9B20-88A26E8A4B43}"/>
+              </a:ext>
+            </a:extLst>
+          </p:cNvPr>
+          <p:cNvSpPr txBox="1"/>
+          <p:nvPr/>
+        </p:nvSpPr>
+        <p:spPr>
+          <a:xfrm>
+            <a:off x="649489" y="370214"/>
+            <a:ext cx="6100174" cy="523220"/>
+          </a:xfrm>
+          <a:prstGeom prst="rect">
+            <a:avLst/>
+          </a:prstGeom>
+          <a:noFill/>
+        </p:spPr>
+        <p:txBody>
+          <a:bodyPr wrap="square">
+            <a:spAutoFit/>
+          </a:bodyPr>
+          <a:lstStyle/>
+          <a:p>
+            <a:r>
+              <a:rPr lang="en-US" sz="2800" b="1" dirty="0">
+                <a:solidFill>
+                  <a:schemeClr val="tx1"/>
+                </a:solidFill>
+              </a:rPr>
+              <a:t>Application Logs</a:t>
+            </a:r>
+            <a:endParaRPr lang="en-US" sz="2800" b="1" dirty="0"/>
+          </a:p>
+        </p:txBody>
+      </p:sp>
+      <p:sp>
+        <p:nvSpPr>
+          <p:cNvPr id="64" name="Rectangle 63">
+            <a:extLst>
+              <a:ext uri="{FF2B5EF4-FFF2-40B4-BE49-F238E27FC236}">
+                <a16:creationId xmlns:a16="http://schemas.microsoft.com/office/drawing/2014/main" id="{909BB081-BF70-624B-A8D4-60BC1E0618EE}"/>
+              </a:ext>
+            </a:extLst>
+          </p:cNvPr>
+          <p:cNvSpPr/>
+          <p:nvPr/>
+        </p:nvSpPr>
+        <p:spPr>
+          <a:xfrm>
+            <a:off x="6431186" y="2321305"/>
+            <a:ext cx="1696397" cy="2911061"/>
+          </a:xfrm>
+          <a:prstGeom prst="rect">
+            <a:avLst/>
+          </a:prstGeom>
+          <a:solidFill>
+            <a:schemeClr val="accent6"/>
+          </a:solidFill>
+        </p:spPr>
+        <p:style>
+          <a:lnRef idx="2">
+            <a:schemeClr val="accent1">
+              <a:shade val="50000"/>
+            </a:schemeClr>
+          </a:lnRef>
+          <a:fillRef idx="1">
+            <a:schemeClr val="accent1"/>
+          </a:fillRef>
+          <a:effectRef idx="0">
+            <a:schemeClr val="accent1"/>
+          </a:effectRef>
+          <a:fontRef idx="minor">
+            <a:schemeClr val="lt1"/>
+          </a:fontRef>
+        </p:style>
+        <p:txBody>
+          <a:bodyPr rtlCol="0" anchor="t"/>
+          <a:lstStyle/>
+          <a:p>
+            <a:pPr algn="ctr"/>
+            <a:r>
+              <a:rPr lang="en-US" dirty="0"/>
+              <a:t>Dynatrace SaaS</a:t>
+            </a:r>
+          </a:p>
+        </p:txBody>
+      </p:sp>
+      <p:pic>
+        <p:nvPicPr>
+          <p:cNvPr id="65" name="Picture 64" descr="Icon&#10;&#10;Description automatically generated">
+            <a:extLst>
+              <a:ext uri="{FF2B5EF4-FFF2-40B4-BE49-F238E27FC236}">
+                <a16:creationId xmlns:a16="http://schemas.microsoft.com/office/drawing/2014/main" id="{952B471A-943B-DD40-9823-B9DB17CACAFB}"/>
+              </a:ext>
+            </a:extLst>
+          </p:cNvPr>
+          <p:cNvPicPr>
+            <a:picLocks noChangeAspect="1"/>
+          </p:cNvPicPr>
+          <p:nvPr/>
+        </p:nvPicPr>
+        <p:blipFill>
+          <a:blip r:embed="rId3"/>
+          <a:stretch>
+            <a:fillRect/>
+          </a:stretch>
+        </p:blipFill>
+        <p:spPr>
+          <a:xfrm>
+            <a:off x="6979993" y="2715751"/>
+            <a:ext cx="598782" cy="598782"/>
+          </a:xfrm>
+          <a:prstGeom prst="rect">
+            <a:avLst/>
+          </a:prstGeom>
+        </p:spPr>
+      </p:pic>
+      <p:sp>
+        <p:nvSpPr>
+          <p:cNvPr id="20" name="Rectangle 19">
+            <a:extLst>
+              <a:ext uri="{FF2B5EF4-FFF2-40B4-BE49-F238E27FC236}">
+                <a16:creationId xmlns:a16="http://schemas.microsoft.com/office/drawing/2014/main" id="{DE59FA5D-578B-FA41-A8A0-47B6F96CE249}"/>
+              </a:ext>
+            </a:extLst>
+          </p:cNvPr>
+          <p:cNvSpPr/>
+          <p:nvPr/>
+        </p:nvSpPr>
+        <p:spPr>
+          <a:xfrm>
+            <a:off x="-1280808" y="-2789539"/>
+            <a:ext cx="1930297" cy="1362159"/>
+          </a:xfrm>
+          <a:prstGeom prst="rect">
+            <a:avLst/>
+          </a:prstGeom>
+          <a:solidFill>
+            <a:schemeClr val="accent6"/>
+          </a:solidFill>
+        </p:spPr>
+        <p:style>
+          <a:lnRef idx="2">
+            <a:schemeClr val="accent1">
+              <a:shade val="50000"/>
+            </a:schemeClr>
+          </a:lnRef>
+          <a:fillRef idx="1">
+            <a:schemeClr val="accent1"/>
+          </a:fillRef>
+          <a:effectRef idx="0">
+            <a:schemeClr val="accent1"/>
+          </a:effectRef>
+          <a:fontRef idx="minor">
+            <a:schemeClr val="lt1"/>
+          </a:fontRef>
+        </p:style>
+        <p:txBody>
+          <a:bodyPr rtlCol="0" anchor="ctr"/>
+          <a:lstStyle/>
+          <a:p>
+            <a:pPr algn="ctr"/>
+            <a:r>
+              <a:rPr lang="en-US" dirty="0">
+                <a:solidFill>
+                  <a:schemeClr val="bg1"/>
+                </a:solidFill>
+              </a:rPr>
+              <a:t>Dynatrace ActiveGate Extension with </a:t>
+            </a:r>
+            <a:r>
+              <a:rPr lang="en-US" dirty="0" err="1">
+                <a:solidFill>
+                  <a:schemeClr val="bg1"/>
+                </a:solidFill>
+              </a:rPr>
+              <a:t>Fluentd</a:t>
+            </a:r>
+            <a:r>
+              <a:rPr lang="en-US" dirty="0">
+                <a:solidFill>
+                  <a:schemeClr val="bg1"/>
+                </a:solidFill>
+              </a:rPr>
+              <a:t> Collector</a:t>
+            </a:r>
+          </a:p>
+        </p:txBody>
+      </p:sp>
+      <p:cxnSp>
+        <p:nvCxnSpPr>
+          <p:cNvPr id="38" name="Straight Arrow Connector 37">
+            <a:extLst>
+              <a:ext uri="{FF2B5EF4-FFF2-40B4-BE49-F238E27FC236}">
+                <a16:creationId xmlns:a16="http://schemas.microsoft.com/office/drawing/2014/main" id="{D31912C0-F1DC-F24B-B420-ED2D621D00D8}"/>
+              </a:ext>
+            </a:extLst>
+          </p:cNvPr>
+          <p:cNvCxnSpPr>
+            <a:cxnSpLocks/>
+          </p:cNvCxnSpPr>
+          <p:nvPr/>
+        </p:nvCxnSpPr>
+        <p:spPr>
+          <a:xfrm>
+            <a:off x="5725723" y="-1232027"/>
+            <a:ext cx="2939798" cy="0"/>
+          </a:xfrm>
+          <a:prstGeom prst="straightConnector1">
+            <a:avLst/>
+          </a:prstGeom>
+          <a:ln w="76200">
+            <a:solidFill>
+              <a:schemeClr val="accent4"/>
+            </a:solidFill>
+            <a:headEnd type="none"/>
+            <a:tailEnd type="triangle"/>
+          </a:ln>
+        </p:spPr>
+        <p:style>
+          <a:lnRef idx="1">
+            <a:schemeClr val="accent1"/>
+          </a:lnRef>
+          <a:fillRef idx="0">
+            <a:schemeClr val="accent1"/>
+          </a:fillRef>
+          <a:effectRef idx="0">
+            <a:schemeClr val="accent1"/>
+          </a:effectRef>
+          <a:fontRef idx="minor">
+            <a:schemeClr val="tx1"/>
+          </a:fontRef>
+        </p:style>
+      </p:cxnSp>
+      <p:sp>
+        <p:nvSpPr>
+          <p:cNvPr id="23" name="TextBox 22">
+            <a:extLst>
+              <a:ext uri="{FF2B5EF4-FFF2-40B4-BE49-F238E27FC236}">
+                <a16:creationId xmlns:a16="http://schemas.microsoft.com/office/drawing/2014/main" id="{6B64A5CE-9182-F74A-A6FA-6DAD2401ED7C}"/>
+              </a:ext>
+            </a:extLst>
+          </p:cNvPr>
+          <p:cNvSpPr txBox="1"/>
+          <p:nvPr/>
+        </p:nvSpPr>
+        <p:spPr>
+          <a:xfrm>
+            <a:off x="4185323" y="-975481"/>
+            <a:ext cx="1104469" cy="369332"/>
+          </a:xfrm>
+          <a:prstGeom prst="rect">
+            <a:avLst/>
+          </a:prstGeom>
+          <a:noFill/>
+        </p:spPr>
+        <p:txBody>
+          <a:bodyPr wrap="square">
+            <a:spAutoFit/>
+          </a:bodyPr>
+          <a:lstStyle/>
+          <a:p>
+            <a:r>
+              <a:rPr lang="en-US" dirty="0">
+                <a:solidFill>
+                  <a:schemeClr val="tx1"/>
+                </a:solidFill>
+              </a:rPr>
+              <a:t>-OR-</a:t>
+            </a:r>
+            <a:endParaRPr lang="en-US" dirty="0"/>
+          </a:p>
+        </p:txBody>
+      </p:sp>
+      <p:sp>
+        <p:nvSpPr>
+          <p:cNvPr id="25" name="TextBox 24">
+            <a:extLst>
+              <a:ext uri="{FF2B5EF4-FFF2-40B4-BE49-F238E27FC236}">
+                <a16:creationId xmlns:a16="http://schemas.microsoft.com/office/drawing/2014/main" id="{FFB6A2BC-ED68-6347-9FF4-48AC25C430EE}"/>
+              </a:ext>
+            </a:extLst>
+          </p:cNvPr>
+          <p:cNvSpPr txBox="1"/>
+          <p:nvPr/>
+        </p:nvSpPr>
+        <p:spPr>
+          <a:xfrm>
+            <a:off x="10534772" y="-2974205"/>
+            <a:ext cx="6096000" cy="369332"/>
+          </a:xfrm>
+          <a:prstGeom prst="rect">
+            <a:avLst/>
+          </a:prstGeom>
+          <a:noFill/>
+        </p:spPr>
+        <p:txBody>
+          <a:bodyPr wrap="square">
+            <a:spAutoFit/>
+          </a:bodyPr>
+          <a:lstStyle/>
+          <a:p>
+            <a:r>
+              <a:rPr lang="en-US" dirty="0"/>
+              <a:t>https://</a:t>
+            </a:r>
+            <a:r>
+              <a:rPr lang="en-US" dirty="0" err="1"/>
+              <a:t>www.youtube.com</a:t>
+            </a:r>
+            <a:r>
+              <a:rPr lang="en-US" dirty="0"/>
+              <a:t>/</a:t>
+            </a:r>
+            <a:r>
+              <a:rPr lang="en-US" dirty="0" err="1"/>
+              <a:t>watch?v</a:t>
+            </a:r>
+            <a:r>
+              <a:rPr lang="en-US" dirty="0"/>
+              <a:t>=j76ozzIbuO8</a:t>
+            </a:r>
+          </a:p>
+        </p:txBody>
+      </p:sp>
+      <p:cxnSp>
+        <p:nvCxnSpPr>
+          <p:cNvPr id="36" name="Straight Arrow Connector 35">
+            <a:extLst>
+              <a:ext uri="{FF2B5EF4-FFF2-40B4-BE49-F238E27FC236}">
+                <a16:creationId xmlns:a16="http://schemas.microsoft.com/office/drawing/2014/main" id="{77604216-3B64-EE42-936C-0DA1CD12BDA2}"/>
+              </a:ext>
+            </a:extLst>
+          </p:cNvPr>
+          <p:cNvCxnSpPr>
+            <a:cxnSpLocks/>
+          </p:cNvCxnSpPr>
+          <p:nvPr/>
+        </p:nvCxnSpPr>
+        <p:spPr>
+          <a:xfrm flipV="1">
+            <a:off x="4139859" y="4543234"/>
+            <a:ext cx="2083023" cy="1"/>
+          </a:xfrm>
+          <a:prstGeom prst="straightConnector1">
+            <a:avLst/>
+          </a:prstGeom>
+          <a:ln w="76200">
+            <a:solidFill>
+              <a:schemeClr val="accent4"/>
+            </a:solidFill>
+            <a:headEnd type="none"/>
+            <a:tailEnd type="triangle"/>
+          </a:ln>
+        </p:spPr>
+        <p:style>
+          <a:lnRef idx="1">
+            <a:schemeClr val="accent1"/>
+          </a:lnRef>
+          <a:fillRef idx="0">
+            <a:schemeClr val="accent1"/>
+          </a:fillRef>
+          <a:effectRef idx="0">
+            <a:schemeClr val="accent1"/>
+          </a:effectRef>
+          <a:fontRef idx="minor">
+            <a:schemeClr val="tx1"/>
+          </a:fontRef>
+        </p:style>
+      </p:cxnSp>
+      <p:sp>
+        <p:nvSpPr>
+          <p:cNvPr id="26" name="TextBox 25">
+            <a:extLst>
+              <a:ext uri="{FF2B5EF4-FFF2-40B4-BE49-F238E27FC236}">
+                <a16:creationId xmlns:a16="http://schemas.microsoft.com/office/drawing/2014/main" id="{11A5C4F4-BBD2-C749-BFE9-1613BD79D79B}"/>
+              </a:ext>
+            </a:extLst>
+          </p:cNvPr>
+          <p:cNvSpPr txBox="1"/>
+          <p:nvPr/>
+        </p:nvSpPr>
+        <p:spPr>
+          <a:xfrm>
+            <a:off x="4343036" y="3994651"/>
+            <a:ext cx="2969231" cy="369332"/>
+          </a:xfrm>
+          <a:prstGeom prst="rect">
+            <a:avLst/>
+          </a:prstGeom>
+          <a:noFill/>
+        </p:spPr>
+        <p:txBody>
+          <a:bodyPr wrap="square">
+            <a:spAutoFit/>
+          </a:bodyPr>
+          <a:lstStyle/>
+          <a:p>
+            <a:r>
+              <a:rPr lang="en-US" dirty="0">
+                <a:solidFill>
+                  <a:schemeClr val="tx1"/>
+                </a:solidFill>
+              </a:rPr>
+              <a:t>sends logs to DT</a:t>
+            </a:r>
+            <a:endParaRPr lang="en-US" dirty="0"/>
+          </a:p>
+        </p:txBody>
+      </p:sp>
+      <p:sp>
+        <p:nvSpPr>
+          <p:cNvPr id="32" name="Rectangle 31">
+            <a:extLst>
+              <a:ext uri="{FF2B5EF4-FFF2-40B4-BE49-F238E27FC236}">
+                <a16:creationId xmlns:a16="http://schemas.microsoft.com/office/drawing/2014/main" id="{7882F701-F209-E94C-9659-CBEFE3F41B98}"/>
+              </a:ext>
+            </a:extLst>
+          </p:cNvPr>
+          <p:cNvSpPr/>
+          <p:nvPr/>
+        </p:nvSpPr>
+        <p:spPr>
+          <a:xfrm>
+            <a:off x="2144111" y="4035133"/>
+            <a:ext cx="1983535" cy="947833"/>
+          </a:xfrm>
+          <a:prstGeom prst="rect">
+            <a:avLst/>
+          </a:prstGeom>
+          <a:solidFill>
+            <a:schemeClr val="accent6"/>
+          </a:solidFill>
+        </p:spPr>
+        <p:style>
+          <a:lnRef idx="2">
+            <a:schemeClr val="accent1">
+              <a:shade val="50000"/>
+            </a:schemeClr>
+          </a:lnRef>
+          <a:fillRef idx="1">
+            <a:schemeClr val="accent1"/>
+          </a:fillRef>
+          <a:effectRef idx="0">
+            <a:schemeClr val="accent1"/>
+          </a:effectRef>
+          <a:fontRef idx="minor">
+            <a:schemeClr val="lt1"/>
+          </a:fontRef>
+        </p:style>
+        <p:txBody>
+          <a:bodyPr rtlCol="0" anchor="ctr"/>
+          <a:lstStyle/>
+          <a:p>
+            <a:pPr algn="ctr"/>
+            <a:r>
+              <a:rPr lang="en-US" dirty="0"/>
+              <a:t>Dynatrace OneAgent</a:t>
+            </a:r>
+          </a:p>
+        </p:txBody>
+      </p:sp>
+      <p:pic>
+        <p:nvPicPr>
+          <p:cNvPr id="37" name="Picture 36" descr="Icon&#10;&#10;Description automatically generated">
+            <a:extLst>
+              <a:ext uri="{FF2B5EF4-FFF2-40B4-BE49-F238E27FC236}">
+                <a16:creationId xmlns:a16="http://schemas.microsoft.com/office/drawing/2014/main" id="{5F3E8B05-A613-1C43-9CB5-83E6B65FF9BF}"/>
+              </a:ext>
+            </a:extLst>
+          </p:cNvPr>
+          <p:cNvPicPr>
+            <a:picLocks noChangeAspect="1"/>
+          </p:cNvPicPr>
+          <p:nvPr/>
+        </p:nvPicPr>
+        <p:blipFill>
+          <a:blip r:embed="rId3"/>
+          <a:stretch>
+            <a:fillRect/>
+          </a:stretch>
+        </p:blipFill>
+        <p:spPr>
+          <a:xfrm>
+            <a:off x="2144111" y="4047689"/>
+            <a:ext cx="374259" cy="374259"/>
+          </a:xfrm>
+          <a:prstGeom prst="rect">
+            <a:avLst/>
+          </a:prstGeom>
+        </p:spPr>
+      </p:pic>
+      <p:pic>
+        <p:nvPicPr>
+          <p:cNvPr id="3" name="Picture 2">
+            <a:extLst>
+              <a:ext uri="{FF2B5EF4-FFF2-40B4-BE49-F238E27FC236}">
+                <a16:creationId xmlns:a16="http://schemas.microsoft.com/office/drawing/2014/main" id="{99CC69D6-B879-FD4F-BBF7-D79954628856}"/>
+              </a:ext>
+            </a:extLst>
+          </p:cNvPr>
+          <p:cNvPicPr>
+            <a:picLocks noChangeAspect="1"/>
+          </p:cNvPicPr>
+          <p:nvPr/>
+        </p:nvPicPr>
+        <p:blipFill>
+          <a:blip r:embed="rId4"/>
+          <a:stretch>
+            <a:fillRect/>
+          </a:stretch>
+        </p:blipFill>
+        <p:spPr>
+          <a:xfrm>
+            <a:off x="6749663" y="3512645"/>
+            <a:ext cx="4146550" cy="2647950"/>
+          </a:xfrm>
+          <a:prstGeom prst="rect">
+            <a:avLst/>
+          </a:prstGeom>
+        </p:spPr>
+      </p:pic>
+    </p:spTree>
+    <p:extLst>
+      <p:ext uri="{BB962C8B-B14F-4D97-AF65-F5344CB8AC3E}">
+        <p14:creationId xmlns:p14="http://schemas.microsoft.com/office/powerpoint/2010/main" val="2888057490"/>
+      </p:ext>
+    </p:extLst>
+  </p:cSld>
+  <p:clrMapOvr>
+    <a:masterClrMapping/>
+  </p:clrMapOvr>
+</p:sld>
+</file>
+
+<file path=ppt/slides/slide8.xml><?xml version="1.0" encoding="utf-8"?>
+<p:sld xmlns:a="http://schemas.openxmlformats.org/drawingml/2006/main" xmlns:r="http://schemas.openxmlformats.org/officeDocument/2006/relationships" xmlns:p="http://schemas.openxmlformats.org/presentationml/2006/main">
+  <p:cSld>
+    <p:spTree>
+      <p:nvGrpSpPr>
+        <p:cNvPr id="1" name=""/>
+        <p:cNvGrpSpPr/>
+        <p:nvPr/>
+      </p:nvGrpSpPr>
+      <p:grpSpPr>
+        <a:xfrm>
+          <a:off x="0" y="0"/>
+          <a:ext cx="0" cy="0"/>
+          <a:chOff x="0" y="0"/>
+          <a:chExt cx="0" cy="0"/>
+        </a:xfrm>
+      </p:grpSpPr>
+      <p:sp>
+        <p:nvSpPr>
+          <p:cNvPr id="31" name="Rectangle 30">
+            <a:extLst>
+              <a:ext uri="{FF2B5EF4-FFF2-40B4-BE49-F238E27FC236}">
+                <a16:creationId xmlns:a16="http://schemas.microsoft.com/office/drawing/2014/main" id="{03F8F137-48EC-C44C-B13A-262542A6AAAF}"/>
+              </a:ext>
+            </a:extLst>
+          </p:cNvPr>
+          <p:cNvSpPr/>
+          <p:nvPr/>
+        </p:nvSpPr>
+        <p:spPr>
+          <a:xfrm>
+            <a:off x="1792693" y="2321305"/>
+            <a:ext cx="2517732" cy="2911058"/>
+          </a:xfrm>
+          <a:prstGeom prst="rect">
+            <a:avLst/>
+          </a:prstGeom>
+          <a:solidFill>
+            <a:schemeClr val="bg1">
+              <a:lumMod val="65000"/>
+            </a:schemeClr>
+          </a:solidFill>
+        </p:spPr>
+        <p:style>
+          <a:lnRef idx="2">
+            <a:schemeClr val="accent1">
+              <a:shade val="50000"/>
+            </a:schemeClr>
+          </a:lnRef>
+          <a:fillRef idx="1">
+            <a:schemeClr val="accent1"/>
+          </a:fillRef>
+          <a:effectRef idx="0">
+            <a:schemeClr val="accent1"/>
+          </a:effectRef>
+          <a:fontRef idx="minor">
+            <a:schemeClr val="lt1"/>
+          </a:fontRef>
+        </p:style>
+        <p:txBody>
+          <a:bodyPr rtlCol="0" anchor="t"/>
+          <a:lstStyle/>
+          <a:p>
+            <a:pPr algn="ctr"/>
+            <a:r>
+              <a:rPr lang="en-US" dirty="0"/>
+              <a:t>Virtual Machine</a:t>
+            </a:r>
+          </a:p>
+        </p:txBody>
+      </p:sp>
+      <p:sp>
+        <p:nvSpPr>
+          <p:cNvPr id="45" name="TextBox 44">
+            <a:extLst>
+              <a:ext uri="{FF2B5EF4-FFF2-40B4-BE49-F238E27FC236}">
+                <a16:creationId xmlns:a16="http://schemas.microsoft.com/office/drawing/2014/main" id="{F8397367-578F-5740-BDF3-4A9E35CC7430}"/>
+              </a:ext>
+            </a:extLst>
+          </p:cNvPr>
+          <p:cNvSpPr txBox="1"/>
+          <p:nvPr/>
+        </p:nvSpPr>
+        <p:spPr>
+          <a:xfrm>
+            <a:off x="6249815" y="-1601359"/>
+            <a:ext cx="3831004" cy="369332"/>
+          </a:xfrm>
+          <a:prstGeom prst="rect">
+            <a:avLst/>
+          </a:prstGeom>
+          <a:noFill/>
+        </p:spPr>
+        <p:txBody>
+          <a:bodyPr wrap="square">
+            <a:spAutoFit/>
+          </a:bodyPr>
+          <a:lstStyle/>
+          <a:p>
+            <a:r>
+              <a:rPr lang="en-US" dirty="0">
+                <a:solidFill>
+                  <a:schemeClr val="tx1"/>
+                </a:solidFill>
+              </a:rPr>
+              <a:t>Log Ingest API</a:t>
+            </a:r>
+            <a:endParaRPr lang="en-US" dirty="0"/>
+          </a:p>
+        </p:txBody>
+      </p:sp>
+      <p:sp>
+        <p:nvSpPr>
+          <p:cNvPr id="63" name="TextBox 62">
+            <a:extLst>
+              <a:ext uri="{FF2B5EF4-FFF2-40B4-BE49-F238E27FC236}">
+                <a16:creationId xmlns:a16="http://schemas.microsoft.com/office/drawing/2014/main" id="{3785A943-E0F2-7D4D-9B20-88A26E8A4B43}"/>
+              </a:ext>
+            </a:extLst>
+          </p:cNvPr>
+          <p:cNvSpPr txBox="1"/>
+          <p:nvPr/>
+        </p:nvSpPr>
+        <p:spPr>
+          <a:xfrm>
+            <a:off x="649489" y="370214"/>
+            <a:ext cx="6100174" cy="523220"/>
+          </a:xfrm>
+          <a:prstGeom prst="rect">
+            <a:avLst/>
+          </a:prstGeom>
+          <a:noFill/>
+        </p:spPr>
+        <p:txBody>
+          <a:bodyPr wrap="square">
+            <a:spAutoFit/>
+          </a:bodyPr>
+          <a:lstStyle/>
+          <a:p>
+            <a:r>
+              <a:rPr lang="en-US" sz="2800" b="1" dirty="0">
+                <a:solidFill>
+                  <a:schemeClr val="tx1"/>
+                </a:solidFill>
+              </a:rPr>
+              <a:t>Application Logs</a:t>
+            </a:r>
+            <a:endParaRPr lang="en-US" sz="2800" b="1" dirty="0"/>
+          </a:p>
+        </p:txBody>
+      </p:sp>
+      <p:sp>
+        <p:nvSpPr>
+          <p:cNvPr id="64" name="Rectangle 63">
+            <a:extLst>
+              <a:ext uri="{FF2B5EF4-FFF2-40B4-BE49-F238E27FC236}">
+                <a16:creationId xmlns:a16="http://schemas.microsoft.com/office/drawing/2014/main" id="{909BB081-BF70-624B-A8D4-60BC1E0618EE}"/>
+              </a:ext>
+            </a:extLst>
+          </p:cNvPr>
+          <p:cNvSpPr/>
+          <p:nvPr/>
+        </p:nvSpPr>
+        <p:spPr>
+          <a:xfrm>
+            <a:off x="6431186" y="2321305"/>
+            <a:ext cx="1696397" cy="2911061"/>
+          </a:xfrm>
+          <a:prstGeom prst="rect">
+            <a:avLst/>
+          </a:prstGeom>
+          <a:solidFill>
+            <a:schemeClr val="accent6"/>
+          </a:solidFill>
+        </p:spPr>
+        <p:style>
+          <a:lnRef idx="2">
+            <a:schemeClr val="accent1">
+              <a:shade val="50000"/>
+            </a:schemeClr>
+          </a:lnRef>
+          <a:fillRef idx="1">
+            <a:schemeClr val="accent1"/>
+          </a:fillRef>
+          <a:effectRef idx="0">
+            <a:schemeClr val="accent1"/>
+          </a:effectRef>
+          <a:fontRef idx="minor">
+            <a:schemeClr val="lt1"/>
+          </a:fontRef>
+        </p:style>
+        <p:txBody>
+          <a:bodyPr rtlCol="0" anchor="t"/>
+          <a:lstStyle/>
+          <a:p>
+            <a:pPr algn="ctr"/>
+            <a:r>
+              <a:rPr lang="en-US" dirty="0"/>
+              <a:t>Dynatrace SaaS</a:t>
+            </a:r>
+          </a:p>
+        </p:txBody>
+      </p:sp>
+      <p:pic>
+        <p:nvPicPr>
+          <p:cNvPr id="65" name="Picture 64" descr="Icon&#10;&#10;Description automatically generated">
+            <a:extLst>
+              <a:ext uri="{FF2B5EF4-FFF2-40B4-BE49-F238E27FC236}">
+                <a16:creationId xmlns:a16="http://schemas.microsoft.com/office/drawing/2014/main" id="{952B471A-943B-DD40-9823-B9DB17CACAFB}"/>
+              </a:ext>
+            </a:extLst>
+          </p:cNvPr>
+          <p:cNvPicPr>
+            <a:picLocks noChangeAspect="1"/>
+          </p:cNvPicPr>
+          <p:nvPr/>
+        </p:nvPicPr>
+        <p:blipFill>
+          <a:blip r:embed="rId2"/>
+          <a:stretch>
+            <a:fillRect/>
+          </a:stretch>
+        </p:blipFill>
+        <p:spPr>
+          <a:xfrm>
+            <a:off x="6979993" y="2715751"/>
+            <a:ext cx="598782" cy="598782"/>
+          </a:xfrm>
+          <a:prstGeom prst="rect">
+            <a:avLst/>
+          </a:prstGeom>
+        </p:spPr>
+      </p:pic>
+      <p:sp>
+        <p:nvSpPr>
+          <p:cNvPr id="20" name="Rectangle 19">
+            <a:extLst>
+              <a:ext uri="{FF2B5EF4-FFF2-40B4-BE49-F238E27FC236}">
+                <a16:creationId xmlns:a16="http://schemas.microsoft.com/office/drawing/2014/main" id="{DE59FA5D-578B-FA41-A8A0-47B6F96CE249}"/>
+              </a:ext>
+            </a:extLst>
+          </p:cNvPr>
+          <p:cNvSpPr/>
+          <p:nvPr/>
+        </p:nvSpPr>
+        <p:spPr>
+          <a:xfrm>
+            <a:off x="-1280808" y="-2789539"/>
+            <a:ext cx="1930297" cy="1362159"/>
+          </a:xfrm>
+          <a:prstGeom prst="rect">
+            <a:avLst/>
+          </a:prstGeom>
+          <a:solidFill>
+            <a:schemeClr val="accent6"/>
+          </a:solidFill>
+        </p:spPr>
+        <p:style>
+          <a:lnRef idx="2">
+            <a:schemeClr val="accent1">
+              <a:shade val="50000"/>
+            </a:schemeClr>
+          </a:lnRef>
+          <a:fillRef idx="1">
+            <a:schemeClr val="accent1"/>
+          </a:fillRef>
+          <a:effectRef idx="0">
+            <a:schemeClr val="accent1"/>
+          </a:effectRef>
+          <a:fontRef idx="minor">
+            <a:schemeClr val="lt1"/>
+          </a:fontRef>
+        </p:style>
+        <p:txBody>
+          <a:bodyPr rtlCol="0" anchor="ctr"/>
+          <a:lstStyle/>
+          <a:p>
+            <a:pPr algn="ctr"/>
+            <a:r>
+              <a:rPr lang="en-US" dirty="0">
+                <a:solidFill>
+                  <a:schemeClr val="bg1"/>
+                </a:solidFill>
+              </a:rPr>
+              <a:t>Dynatrace ActiveGate Extension with </a:t>
+            </a:r>
+            <a:r>
+              <a:rPr lang="en-US" dirty="0" err="1">
+                <a:solidFill>
+                  <a:schemeClr val="bg1"/>
+                </a:solidFill>
+              </a:rPr>
+              <a:t>Fluentd</a:t>
+            </a:r>
+            <a:r>
+              <a:rPr lang="en-US" dirty="0">
+                <a:solidFill>
+                  <a:schemeClr val="bg1"/>
+                </a:solidFill>
+              </a:rPr>
+              <a:t> Collector</a:t>
+            </a:r>
+          </a:p>
+        </p:txBody>
+      </p:sp>
+      <p:cxnSp>
+        <p:nvCxnSpPr>
+          <p:cNvPr id="38" name="Straight Arrow Connector 37">
+            <a:extLst>
+              <a:ext uri="{FF2B5EF4-FFF2-40B4-BE49-F238E27FC236}">
+                <a16:creationId xmlns:a16="http://schemas.microsoft.com/office/drawing/2014/main" id="{D31912C0-F1DC-F24B-B420-ED2D621D00D8}"/>
+              </a:ext>
+            </a:extLst>
+          </p:cNvPr>
+          <p:cNvCxnSpPr>
+            <a:cxnSpLocks/>
+          </p:cNvCxnSpPr>
+          <p:nvPr/>
+        </p:nvCxnSpPr>
+        <p:spPr>
+          <a:xfrm>
+            <a:off x="5725723" y="-1232027"/>
+            <a:ext cx="2939798" cy="0"/>
+          </a:xfrm>
+          <a:prstGeom prst="straightConnector1">
+            <a:avLst/>
+          </a:prstGeom>
+          <a:ln w="76200">
+            <a:solidFill>
+              <a:schemeClr val="accent4"/>
+            </a:solidFill>
+            <a:headEnd type="none"/>
+            <a:tailEnd type="triangle"/>
+          </a:ln>
+        </p:spPr>
+        <p:style>
+          <a:lnRef idx="1">
+            <a:schemeClr val="accent1"/>
+          </a:lnRef>
+          <a:fillRef idx="0">
+            <a:schemeClr val="accent1"/>
+          </a:fillRef>
+          <a:effectRef idx="0">
+            <a:schemeClr val="accent1"/>
+          </a:effectRef>
+          <a:fontRef idx="minor">
+            <a:schemeClr val="tx1"/>
+          </a:fontRef>
+        </p:style>
+      </p:cxnSp>
+      <p:sp>
+        <p:nvSpPr>
+          <p:cNvPr id="23" name="TextBox 22">
+            <a:extLst>
+              <a:ext uri="{FF2B5EF4-FFF2-40B4-BE49-F238E27FC236}">
+                <a16:creationId xmlns:a16="http://schemas.microsoft.com/office/drawing/2014/main" id="{6B64A5CE-9182-F74A-A6FA-6DAD2401ED7C}"/>
+              </a:ext>
+            </a:extLst>
+          </p:cNvPr>
+          <p:cNvSpPr txBox="1"/>
+          <p:nvPr/>
+        </p:nvSpPr>
+        <p:spPr>
+          <a:xfrm>
+            <a:off x="4185323" y="-975481"/>
+            <a:ext cx="1104469" cy="369332"/>
+          </a:xfrm>
+          <a:prstGeom prst="rect">
+            <a:avLst/>
+          </a:prstGeom>
+          <a:noFill/>
+        </p:spPr>
+        <p:txBody>
+          <a:bodyPr wrap="square">
+            <a:spAutoFit/>
+          </a:bodyPr>
+          <a:lstStyle/>
+          <a:p>
+            <a:r>
+              <a:rPr lang="en-US" dirty="0">
+                <a:solidFill>
+                  <a:schemeClr val="tx1"/>
+                </a:solidFill>
+              </a:rPr>
+              <a:t>-OR-</a:t>
+            </a:r>
+            <a:endParaRPr lang="en-US" dirty="0"/>
+          </a:p>
+        </p:txBody>
+      </p:sp>
+      <p:sp>
+        <p:nvSpPr>
+          <p:cNvPr id="25" name="TextBox 24">
+            <a:extLst>
+              <a:ext uri="{FF2B5EF4-FFF2-40B4-BE49-F238E27FC236}">
+                <a16:creationId xmlns:a16="http://schemas.microsoft.com/office/drawing/2014/main" id="{FFB6A2BC-ED68-6347-9FF4-48AC25C430EE}"/>
+              </a:ext>
+            </a:extLst>
+          </p:cNvPr>
+          <p:cNvSpPr txBox="1"/>
+          <p:nvPr/>
+        </p:nvSpPr>
+        <p:spPr>
+          <a:xfrm>
+            <a:off x="10534772" y="-2974205"/>
+            <a:ext cx="6096000" cy="369332"/>
+          </a:xfrm>
+          <a:prstGeom prst="rect">
+            <a:avLst/>
+          </a:prstGeom>
+          <a:noFill/>
+        </p:spPr>
+        <p:txBody>
+          <a:bodyPr wrap="square">
+            <a:spAutoFit/>
+          </a:bodyPr>
+          <a:lstStyle/>
+          <a:p>
+            <a:r>
+              <a:rPr lang="en-US" dirty="0"/>
+              <a:t>https://</a:t>
+            </a:r>
+            <a:r>
+              <a:rPr lang="en-US" dirty="0" err="1"/>
+              <a:t>www.youtube.com</a:t>
+            </a:r>
+            <a:r>
+              <a:rPr lang="en-US" dirty="0"/>
+              <a:t>/</a:t>
+            </a:r>
+            <a:r>
+              <a:rPr lang="en-US" dirty="0" err="1"/>
+              <a:t>watch?v</a:t>
+            </a:r>
+            <a:r>
+              <a:rPr lang="en-US" dirty="0"/>
+              <a:t>=j76ozzIbuO8</a:t>
+            </a:r>
+          </a:p>
+        </p:txBody>
+      </p:sp>
+      <p:cxnSp>
+        <p:nvCxnSpPr>
+          <p:cNvPr id="36" name="Straight Arrow Connector 35">
+            <a:extLst>
+              <a:ext uri="{FF2B5EF4-FFF2-40B4-BE49-F238E27FC236}">
+                <a16:creationId xmlns:a16="http://schemas.microsoft.com/office/drawing/2014/main" id="{77604216-3B64-EE42-936C-0DA1CD12BDA2}"/>
+              </a:ext>
+            </a:extLst>
+          </p:cNvPr>
+          <p:cNvCxnSpPr>
+            <a:cxnSpLocks/>
+          </p:cNvCxnSpPr>
+          <p:nvPr/>
+        </p:nvCxnSpPr>
+        <p:spPr>
+          <a:xfrm flipV="1">
+            <a:off x="4139859" y="4543234"/>
+            <a:ext cx="2083023" cy="1"/>
+          </a:xfrm>
+          <a:prstGeom prst="straightConnector1">
+            <a:avLst/>
+          </a:prstGeom>
+          <a:ln w="76200">
+            <a:solidFill>
+              <a:schemeClr val="accent4"/>
+            </a:solidFill>
+            <a:headEnd type="none"/>
+            <a:tailEnd type="triangle"/>
+          </a:ln>
+        </p:spPr>
+        <p:style>
+          <a:lnRef idx="1">
+            <a:schemeClr val="accent1"/>
+          </a:lnRef>
+          <a:fillRef idx="0">
+            <a:schemeClr val="accent1"/>
+          </a:fillRef>
+          <a:effectRef idx="0">
+            <a:schemeClr val="accent1"/>
+          </a:effectRef>
+          <a:fontRef idx="minor">
+            <a:schemeClr val="tx1"/>
+          </a:fontRef>
+        </p:style>
+      </p:cxnSp>
+      <p:sp>
+        <p:nvSpPr>
+          <p:cNvPr id="26" name="TextBox 25">
+            <a:extLst>
+              <a:ext uri="{FF2B5EF4-FFF2-40B4-BE49-F238E27FC236}">
+                <a16:creationId xmlns:a16="http://schemas.microsoft.com/office/drawing/2014/main" id="{11A5C4F4-BBD2-C749-BFE9-1613BD79D79B}"/>
+              </a:ext>
+            </a:extLst>
+          </p:cNvPr>
+          <p:cNvSpPr txBox="1"/>
+          <p:nvPr/>
+        </p:nvSpPr>
+        <p:spPr>
+          <a:xfrm>
+            <a:off x="4343036" y="3776834"/>
+            <a:ext cx="2088150" cy="646331"/>
+          </a:xfrm>
+          <a:prstGeom prst="rect">
+            <a:avLst/>
+          </a:prstGeom>
+          <a:noFill/>
+        </p:spPr>
+        <p:txBody>
+          <a:bodyPr wrap="square">
+            <a:spAutoFit/>
+          </a:bodyPr>
+          <a:lstStyle/>
+          <a:p>
+            <a:r>
+              <a:rPr lang="en-US" dirty="0">
+                <a:solidFill>
+                  <a:schemeClr val="tx1"/>
+                </a:solidFill>
+              </a:rPr>
+              <a:t>Calls the V2 Logs API to post log data</a:t>
+            </a:r>
+            <a:endParaRPr lang="en-US" dirty="0"/>
+          </a:p>
+        </p:txBody>
+      </p:sp>
+      <p:sp>
+        <p:nvSpPr>
+          <p:cNvPr id="19" name="Rectangle 18">
+            <a:extLst>
+              <a:ext uri="{FF2B5EF4-FFF2-40B4-BE49-F238E27FC236}">
+                <a16:creationId xmlns:a16="http://schemas.microsoft.com/office/drawing/2014/main" id="{F9BF3093-118D-834E-A890-2A8D2228B2EB}"/>
+              </a:ext>
+            </a:extLst>
+          </p:cNvPr>
+          <p:cNvSpPr/>
+          <p:nvPr/>
+        </p:nvSpPr>
+        <p:spPr>
+          <a:xfrm>
+            <a:off x="2009986" y="4292017"/>
+            <a:ext cx="2025721" cy="502434"/>
+          </a:xfrm>
+          <a:prstGeom prst="rect">
+            <a:avLst/>
+          </a:prstGeom>
+          <a:solidFill>
+            <a:srgbClr val="182F9E"/>
+          </a:solidFill>
+        </p:spPr>
+        <p:style>
+          <a:lnRef idx="2">
+            <a:schemeClr val="accent1">
+              <a:shade val="50000"/>
+            </a:schemeClr>
+          </a:lnRef>
+          <a:fillRef idx="1">
+            <a:schemeClr val="accent1"/>
+          </a:fillRef>
+          <a:effectRef idx="0">
+            <a:schemeClr val="accent1"/>
+          </a:effectRef>
+          <a:fontRef idx="minor">
+            <a:schemeClr val="lt1"/>
+          </a:fontRef>
+        </p:style>
+        <p:txBody>
+          <a:bodyPr rtlCol="0" anchor="ctr"/>
+          <a:lstStyle/>
+          <a:p>
+            <a:pPr algn="ctr"/>
+            <a:r>
+              <a:rPr lang="en-US" dirty="0">
+                <a:solidFill>
+                  <a:schemeClr val="bg1"/>
+                </a:solidFill>
+              </a:rPr>
+              <a:t>./</a:t>
+            </a:r>
+            <a:r>
+              <a:rPr lang="en-US" dirty="0" err="1">
+                <a:solidFill>
+                  <a:schemeClr val="bg1"/>
+                </a:solidFill>
+              </a:rPr>
+              <a:t>sendlogs.sh</a:t>
+            </a:r>
+            <a:endParaRPr lang="en-US" dirty="0">
+              <a:solidFill>
+                <a:schemeClr val="bg1"/>
+              </a:solidFill>
+            </a:endParaRPr>
+          </a:p>
+        </p:txBody>
+      </p:sp>
+      <p:pic>
+        <p:nvPicPr>
+          <p:cNvPr id="2" name="Picture 1">
+            <a:extLst>
+              <a:ext uri="{FF2B5EF4-FFF2-40B4-BE49-F238E27FC236}">
+                <a16:creationId xmlns:a16="http://schemas.microsoft.com/office/drawing/2014/main" id="{E0B6DA0A-5019-3D45-84CF-757FC691478A}"/>
+              </a:ext>
+            </a:extLst>
+          </p:cNvPr>
+          <p:cNvPicPr>
+            <a:picLocks noChangeAspect="1"/>
+          </p:cNvPicPr>
+          <p:nvPr/>
+        </p:nvPicPr>
+        <p:blipFill>
+          <a:blip r:embed="rId3"/>
+          <a:stretch>
+            <a:fillRect/>
+          </a:stretch>
+        </p:blipFill>
+        <p:spPr>
+          <a:xfrm>
+            <a:off x="5845996" y="3305532"/>
+            <a:ext cx="4390204" cy="2168168"/>
+          </a:xfrm>
+          <a:prstGeom prst="rect">
+            <a:avLst/>
+          </a:prstGeom>
+        </p:spPr>
+      </p:pic>
+    </p:spTree>
+    <p:extLst>
+      <p:ext uri="{BB962C8B-B14F-4D97-AF65-F5344CB8AC3E}">
+        <p14:creationId xmlns:p14="http://schemas.microsoft.com/office/powerpoint/2010/main" val="3997620709"/>
+      </p:ext>
+    </p:extLst>
+  </p:cSld>
+  <p:clrMapOvr>
+    <a:masterClrMapping/>
+  </p:clrMapOvr>
+</p:sld>
+</file>
+
+<file path=ppt/slides/slide9.xml><?xml version="1.0" encoding="utf-8"?>
+<p:sld xmlns:a="http://schemas.openxmlformats.org/drawingml/2006/main" xmlns:r="http://schemas.openxmlformats.org/officeDocument/2006/relationships" xmlns:p="http://schemas.openxmlformats.org/presentationml/2006/main">
+  <p:cSld>
+    <p:spTree>
+      <p:nvGrpSpPr>
+        <p:cNvPr id="1" name=""/>
+        <p:cNvGrpSpPr/>
+        <p:nvPr/>
+      </p:nvGrpSpPr>
+      <p:grpSpPr>
+        <a:xfrm>
+          <a:off x="0" y="0"/>
+          <a:ext cx="0" cy="0"/>
+          <a:chOff x="0" y="0"/>
+          <a:chExt cx="0" cy="0"/>
+        </a:xfrm>
+      </p:grpSpPr>
+      <p:sp>
+        <p:nvSpPr>
+          <p:cNvPr id="33" name="Rectangle 32">
+            <a:extLst>
+              <a:ext uri="{FF2B5EF4-FFF2-40B4-BE49-F238E27FC236}">
+                <a16:creationId xmlns:a16="http://schemas.microsoft.com/office/drawing/2014/main" id="{63671C80-4FB7-D04C-8868-8AC54D8BDB10}"/>
+              </a:ext>
+            </a:extLst>
+          </p:cNvPr>
+          <p:cNvSpPr/>
+          <p:nvPr/>
+        </p:nvSpPr>
+        <p:spPr>
+          <a:xfrm>
+            <a:off x="7874887" y="2186010"/>
+            <a:ext cx="1280280" cy="1856213"/>
+          </a:xfrm>
+          <a:prstGeom prst="rect">
+            <a:avLst/>
+          </a:prstGeom>
+          <a:solidFill>
+            <a:schemeClr val="accent6"/>
+          </a:solidFill>
+        </p:spPr>
+        <p:style>
+          <a:lnRef idx="2">
+            <a:schemeClr val="accent1">
+              <a:shade val="50000"/>
+            </a:schemeClr>
+          </a:lnRef>
+          <a:fillRef idx="1">
+            <a:schemeClr val="accent1"/>
+          </a:fillRef>
+          <a:effectRef idx="0">
+            <a:schemeClr val="accent1"/>
+          </a:effectRef>
+          <a:fontRef idx="minor">
+            <a:schemeClr val="lt1"/>
+          </a:fontRef>
+        </p:style>
+        <p:txBody>
+          <a:bodyPr rtlCol="0" anchor="ctr"/>
+          <a:lstStyle/>
+          <a:p>
+            <a:pPr algn="ctr"/>
+            <a:r>
+              <a:rPr lang="en-US" dirty="0"/>
+              <a:t>Dynatrace Metric</a:t>
+            </a:r>
+          </a:p>
+        </p:txBody>
+      </p:sp>
+      <p:cxnSp>
+        <p:nvCxnSpPr>
+          <p:cNvPr id="38" name="Straight Arrow Connector 37">
+            <a:extLst>
+              <a:ext uri="{FF2B5EF4-FFF2-40B4-BE49-F238E27FC236}">
+                <a16:creationId xmlns:a16="http://schemas.microsoft.com/office/drawing/2014/main" id="{D31912C0-F1DC-F24B-B420-ED2D621D00D8}"/>
+              </a:ext>
+            </a:extLst>
+          </p:cNvPr>
+          <p:cNvCxnSpPr>
+            <a:cxnSpLocks/>
+          </p:cNvCxnSpPr>
+          <p:nvPr/>
+        </p:nvCxnSpPr>
+        <p:spPr>
+          <a:xfrm>
+            <a:off x="7144939" y="2589073"/>
+            <a:ext cx="729947" cy="7182"/>
+          </a:xfrm>
+          <a:prstGeom prst="straightConnector1">
+            <a:avLst/>
+          </a:prstGeom>
+          <a:ln w="76200">
+            <a:solidFill>
+              <a:schemeClr val="accent4"/>
+            </a:solidFill>
+            <a:headEnd type="none"/>
+            <a:tailEnd type="triangle"/>
+          </a:ln>
+        </p:spPr>
+        <p:style>
+          <a:lnRef idx="1">
+            <a:schemeClr val="accent1"/>
+          </a:lnRef>
+          <a:fillRef idx="0">
+            <a:schemeClr val="accent1"/>
+          </a:fillRef>
+          <a:effectRef idx="0">
+            <a:schemeClr val="accent1"/>
+          </a:effectRef>
+          <a:fontRef idx="minor">
+            <a:schemeClr val="tx1"/>
+          </a:fontRef>
+        </p:style>
+      </p:cxnSp>
+      <p:sp>
+        <p:nvSpPr>
+          <p:cNvPr id="12" name="Rectangle 11">
+            <a:extLst>
+              <a:ext uri="{FF2B5EF4-FFF2-40B4-BE49-F238E27FC236}">
+                <a16:creationId xmlns:a16="http://schemas.microsoft.com/office/drawing/2014/main" id="{2B97C487-F867-6C47-A606-AFF2F9DFD848}"/>
+              </a:ext>
+            </a:extLst>
+          </p:cNvPr>
+          <p:cNvSpPr/>
+          <p:nvPr/>
+        </p:nvSpPr>
+        <p:spPr>
+          <a:xfrm>
+            <a:off x="2958851" y="3210932"/>
+            <a:ext cx="1696397" cy="831292"/>
+          </a:xfrm>
+          <a:prstGeom prst="rect">
+            <a:avLst/>
+          </a:prstGeom>
+          <a:solidFill>
+            <a:schemeClr val="accent6"/>
+          </a:solidFill>
+        </p:spPr>
+        <p:style>
+          <a:lnRef idx="2">
+            <a:schemeClr val="accent1">
+              <a:shade val="50000"/>
+            </a:schemeClr>
+          </a:lnRef>
+          <a:fillRef idx="1">
+            <a:schemeClr val="accent1"/>
+          </a:fillRef>
+          <a:effectRef idx="0">
+            <a:schemeClr val="accent1"/>
+          </a:effectRef>
+          <a:fontRef idx="minor">
+            <a:schemeClr val="lt1"/>
+          </a:fontRef>
+        </p:style>
+        <p:txBody>
+          <a:bodyPr rtlCol="0" anchor="ctr"/>
+          <a:lstStyle/>
+          <a:p>
+            <a:pPr algn="ctr"/>
+            <a:r>
+              <a:rPr lang="en-US" dirty="0"/>
+              <a:t>Dynatrace OneAgent send Log to DT</a:t>
+            </a:r>
+          </a:p>
+        </p:txBody>
+      </p:sp>
+      <p:sp>
+        <p:nvSpPr>
+          <p:cNvPr id="13" name="Rectangle 12">
+            <a:extLst>
+              <a:ext uri="{FF2B5EF4-FFF2-40B4-BE49-F238E27FC236}">
+                <a16:creationId xmlns:a16="http://schemas.microsoft.com/office/drawing/2014/main" id="{783BF3D9-521D-7145-9C3B-ABAE76E24B46}"/>
+              </a:ext>
+            </a:extLst>
+          </p:cNvPr>
+          <p:cNvSpPr/>
+          <p:nvPr/>
+        </p:nvSpPr>
+        <p:spPr>
+          <a:xfrm>
+            <a:off x="5448542" y="3207371"/>
+            <a:ext cx="1696397" cy="834853"/>
+          </a:xfrm>
+          <a:prstGeom prst="rect">
+            <a:avLst/>
+          </a:prstGeom>
+          <a:solidFill>
+            <a:schemeClr val="accent6"/>
+          </a:solidFill>
+        </p:spPr>
+        <p:style>
+          <a:lnRef idx="2">
+            <a:schemeClr val="accent1">
+              <a:shade val="50000"/>
+            </a:schemeClr>
+          </a:lnRef>
+          <a:fillRef idx="1">
+            <a:schemeClr val="accent1"/>
+          </a:fillRef>
+          <a:effectRef idx="0">
+            <a:schemeClr val="accent1"/>
+          </a:effectRef>
+          <a:fontRef idx="minor">
+            <a:schemeClr val="lt1"/>
+          </a:fontRef>
+        </p:style>
+        <p:txBody>
+          <a:bodyPr rtlCol="0" anchor="ctr"/>
+          <a:lstStyle/>
+          <a:p>
+            <a:pPr algn="ctr"/>
+            <a:r>
+              <a:rPr lang="en-US" dirty="0"/>
+              <a:t>Dynatrace Log Metric Rule makes metric</a:t>
+            </a:r>
+          </a:p>
+        </p:txBody>
+      </p:sp>
+      <p:sp>
+        <p:nvSpPr>
+          <p:cNvPr id="14" name="Rectangle 13">
+            <a:extLst>
+              <a:ext uri="{FF2B5EF4-FFF2-40B4-BE49-F238E27FC236}">
+                <a16:creationId xmlns:a16="http://schemas.microsoft.com/office/drawing/2014/main" id="{15ADCB13-01B8-7E42-B1F1-71EFBDB9C4AA}"/>
+              </a:ext>
+            </a:extLst>
+          </p:cNvPr>
+          <p:cNvSpPr/>
+          <p:nvPr/>
+        </p:nvSpPr>
+        <p:spPr>
+          <a:xfrm>
+            <a:off x="5448542" y="2171647"/>
+            <a:ext cx="1696397" cy="834853"/>
+          </a:xfrm>
+          <a:prstGeom prst="rect">
+            <a:avLst/>
+          </a:prstGeom>
+          <a:solidFill>
+            <a:schemeClr val="accent6"/>
+          </a:solidFill>
+        </p:spPr>
+        <p:style>
+          <a:lnRef idx="2">
+            <a:schemeClr val="accent1">
+              <a:shade val="50000"/>
+            </a:schemeClr>
+          </a:lnRef>
+          <a:fillRef idx="1">
+            <a:schemeClr val="accent1"/>
+          </a:fillRef>
+          <a:effectRef idx="0">
+            <a:schemeClr val="accent1"/>
+          </a:effectRef>
+          <a:fontRef idx="minor">
+            <a:schemeClr val="lt1"/>
+          </a:fontRef>
+        </p:style>
+        <p:txBody>
+          <a:bodyPr rtlCol="0" anchor="ctr"/>
+          <a:lstStyle/>
+          <a:p>
+            <a:pPr algn="ctr"/>
+            <a:r>
+              <a:rPr lang="en-US" dirty="0"/>
+              <a:t>Dynatrace Metric</a:t>
+            </a:r>
+          </a:p>
+        </p:txBody>
+      </p:sp>
+      <p:cxnSp>
+        <p:nvCxnSpPr>
+          <p:cNvPr id="16" name="Straight Arrow Connector 15">
+            <a:extLst>
+              <a:ext uri="{FF2B5EF4-FFF2-40B4-BE49-F238E27FC236}">
+                <a16:creationId xmlns:a16="http://schemas.microsoft.com/office/drawing/2014/main" id="{B18C84E4-51B0-FA4B-8C09-88B17CA2A94F}"/>
+              </a:ext>
+            </a:extLst>
+          </p:cNvPr>
+          <p:cNvCxnSpPr>
+            <a:cxnSpLocks/>
+          </p:cNvCxnSpPr>
+          <p:nvPr/>
+        </p:nvCxnSpPr>
+        <p:spPr>
+          <a:xfrm>
+            <a:off x="7144939" y="3617615"/>
+            <a:ext cx="729947" cy="7182"/>
+          </a:xfrm>
+          <a:prstGeom prst="straightConnector1">
+            <a:avLst/>
+          </a:prstGeom>
+          <a:ln w="76200">
+            <a:solidFill>
+              <a:schemeClr val="accent4"/>
+            </a:solidFill>
+            <a:headEnd type="none"/>
+            <a:tailEnd type="triangle"/>
+          </a:ln>
+        </p:spPr>
+        <p:style>
+          <a:lnRef idx="1">
+            <a:schemeClr val="accent1"/>
+          </a:lnRef>
+          <a:fillRef idx="0">
+            <a:schemeClr val="accent1"/>
+          </a:fillRef>
+          <a:effectRef idx="0">
+            <a:schemeClr val="accent1"/>
+          </a:effectRef>
+          <a:fontRef idx="minor">
+            <a:schemeClr val="tx1"/>
+          </a:fontRef>
+        </p:style>
+      </p:cxnSp>
+      <p:cxnSp>
+        <p:nvCxnSpPr>
+          <p:cNvPr id="17" name="Straight Arrow Connector 16">
+            <a:extLst>
+              <a:ext uri="{FF2B5EF4-FFF2-40B4-BE49-F238E27FC236}">
+                <a16:creationId xmlns:a16="http://schemas.microsoft.com/office/drawing/2014/main" id="{A1E42B1F-0067-684B-AAF6-36A3DBD71AEC}"/>
+              </a:ext>
+            </a:extLst>
+          </p:cNvPr>
+          <p:cNvCxnSpPr>
+            <a:cxnSpLocks/>
+          </p:cNvCxnSpPr>
+          <p:nvPr/>
+        </p:nvCxnSpPr>
+        <p:spPr>
+          <a:xfrm>
+            <a:off x="4722006" y="3633834"/>
+            <a:ext cx="729947" cy="7182"/>
+          </a:xfrm>
+          <a:prstGeom prst="straightConnector1">
+            <a:avLst/>
+          </a:prstGeom>
+          <a:ln w="76200">
+            <a:solidFill>
+              <a:schemeClr val="accent4"/>
+            </a:solidFill>
+            <a:headEnd type="none"/>
+            <a:tailEnd type="triangle"/>
+          </a:ln>
+        </p:spPr>
+        <p:style>
+          <a:lnRef idx="1">
+            <a:schemeClr val="accent1"/>
+          </a:lnRef>
+          <a:fillRef idx="0">
+            <a:schemeClr val="accent1"/>
+          </a:fillRef>
+          <a:effectRef idx="0">
+            <a:schemeClr val="accent1"/>
+          </a:effectRef>
+          <a:fontRef idx="minor">
+            <a:schemeClr val="tx1"/>
+          </a:fontRef>
+        </p:style>
+      </p:cxnSp>
+      <p:sp>
+        <p:nvSpPr>
+          <p:cNvPr id="18" name="Rectangle 17">
+            <a:extLst>
+              <a:ext uri="{FF2B5EF4-FFF2-40B4-BE49-F238E27FC236}">
+                <a16:creationId xmlns:a16="http://schemas.microsoft.com/office/drawing/2014/main" id="{68E47118-B941-A24E-9B89-538D88BC15CF}"/>
+              </a:ext>
+            </a:extLst>
+          </p:cNvPr>
+          <p:cNvSpPr/>
+          <p:nvPr/>
+        </p:nvSpPr>
+        <p:spPr>
+          <a:xfrm>
+            <a:off x="678790" y="3201969"/>
+            <a:ext cx="1280280" cy="831292"/>
+          </a:xfrm>
+          <a:prstGeom prst="rect">
+            <a:avLst/>
+          </a:prstGeom>
+          <a:solidFill>
+            <a:schemeClr val="bg1">
+              <a:lumMod val="75000"/>
+            </a:schemeClr>
+          </a:solidFill>
+        </p:spPr>
+        <p:style>
+          <a:lnRef idx="2">
+            <a:schemeClr val="accent1">
+              <a:shade val="50000"/>
+            </a:schemeClr>
+          </a:lnRef>
+          <a:fillRef idx="1">
+            <a:schemeClr val="accent1"/>
+          </a:fillRef>
+          <a:effectRef idx="0">
+            <a:schemeClr val="accent1"/>
+          </a:effectRef>
+          <a:fontRef idx="minor">
+            <a:schemeClr val="lt1"/>
+          </a:fontRef>
+        </p:style>
+        <p:txBody>
+          <a:bodyPr rtlCol="0" anchor="ctr"/>
+          <a:lstStyle/>
+          <a:p>
+            <a:pPr algn="ctr"/>
+            <a:r>
+              <a:rPr lang="en-US" dirty="0">
+                <a:solidFill>
+                  <a:schemeClr val="tx1"/>
+                </a:solidFill>
+              </a:rPr>
+              <a:t>Application Log</a:t>
+            </a:r>
+          </a:p>
+        </p:txBody>
+      </p:sp>
+      <p:cxnSp>
+        <p:nvCxnSpPr>
+          <p:cNvPr id="19" name="Straight Arrow Connector 18">
+            <a:extLst>
+              <a:ext uri="{FF2B5EF4-FFF2-40B4-BE49-F238E27FC236}">
+                <a16:creationId xmlns:a16="http://schemas.microsoft.com/office/drawing/2014/main" id="{AC233868-56A4-C840-BD7F-033BDE64CF5B}"/>
+              </a:ext>
+            </a:extLst>
+          </p:cNvPr>
+          <p:cNvCxnSpPr>
+            <a:cxnSpLocks/>
+          </p:cNvCxnSpPr>
+          <p:nvPr/>
+        </p:nvCxnSpPr>
+        <p:spPr>
+          <a:xfrm>
+            <a:off x="2165557" y="3641016"/>
+            <a:ext cx="729947" cy="7182"/>
+          </a:xfrm>
+          <a:prstGeom prst="straightConnector1">
+            <a:avLst/>
+          </a:prstGeom>
+          <a:ln w="76200">
+            <a:solidFill>
+              <a:schemeClr val="accent4"/>
+            </a:solidFill>
+            <a:headEnd type="none"/>
+            <a:tailEnd type="triangle"/>
+          </a:ln>
+        </p:spPr>
+        <p:style>
+          <a:lnRef idx="1">
+            <a:schemeClr val="accent1"/>
+          </a:lnRef>
+          <a:fillRef idx="0">
+            <a:schemeClr val="accent1"/>
+          </a:fillRef>
+          <a:effectRef idx="0">
+            <a:schemeClr val="accent1"/>
+          </a:effectRef>
+          <a:fontRef idx="minor">
+            <a:schemeClr val="tx1"/>
+          </a:fontRef>
+        </p:style>
+      </p:cxnSp>
+      <p:sp>
+        <p:nvSpPr>
+          <p:cNvPr id="20" name="Rectangle 19">
+            <a:extLst>
+              <a:ext uri="{FF2B5EF4-FFF2-40B4-BE49-F238E27FC236}">
+                <a16:creationId xmlns:a16="http://schemas.microsoft.com/office/drawing/2014/main" id="{AB2BCFE1-475C-0B46-AE00-0A78BF66B878}"/>
+              </a:ext>
+            </a:extLst>
+          </p:cNvPr>
+          <p:cNvSpPr/>
+          <p:nvPr/>
+        </p:nvSpPr>
+        <p:spPr>
+          <a:xfrm>
+            <a:off x="2970398" y="1785255"/>
+            <a:ext cx="1696397" cy="1219464"/>
+          </a:xfrm>
+          <a:prstGeom prst="rect">
+            <a:avLst/>
+          </a:prstGeom>
+          <a:solidFill>
+            <a:schemeClr val="bg1">
+              <a:lumMod val="75000"/>
+            </a:schemeClr>
+          </a:solidFill>
+        </p:spPr>
+        <p:style>
+          <a:lnRef idx="2">
+            <a:schemeClr val="accent1">
+              <a:shade val="50000"/>
+            </a:schemeClr>
+          </a:lnRef>
+          <a:fillRef idx="1">
+            <a:schemeClr val="accent1"/>
+          </a:fillRef>
+          <a:effectRef idx="0">
+            <a:schemeClr val="accent1"/>
+          </a:effectRef>
+          <a:fontRef idx="minor">
+            <a:schemeClr val="lt1"/>
+          </a:fontRef>
+        </p:style>
+        <p:txBody>
+          <a:bodyPr rtlCol="0" anchor="ctr"/>
+          <a:lstStyle/>
+          <a:p>
+            <a:pPr algn="ctr"/>
+            <a:r>
+              <a:rPr lang="en-US" dirty="0" err="1">
+                <a:solidFill>
+                  <a:schemeClr val="tx1"/>
+                </a:solidFill>
+              </a:rPr>
+              <a:t>StatsD</a:t>
+            </a:r>
+            <a:r>
+              <a:rPr lang="en-US" dirty="0">
+                <a:solidFill>
+                  <a:schemeClr val="tx1"/>
+                </a:solidFill>
+              </a:rPr>
+              <a:t> metrics sent in via Dynatrace ActiveGate</a:t>
+            </a:r>
+          </a:p>
+        </p:txBody>
+      </p:sp>
+      <p:cxnSp>
+        <p:nvCxnSpPr>
+          <p:cNvPr id="21" name="Straight Arrow Connector 20">
+            <a:extLst>
+              <a:ext uri="{FF2B5EF4-FFF2-40B4-BE49-F238E27FC236}">
+                <a16:creationId xmlns:a16="http://schemas.microsoft.com/office/drawing/2014/main" id="{1C82A57A-4F8C-A144-8129-DAA4570691BF}"/>
+              </a:ext>
+            </a:extLst>
+          </p:cNvPr>
+          <p:cNvCxnSpPr>
+            <a:cxnSpLocks/>
+          </p:cNvCxnSpPr>
+          <p:nvPr/>
+        </p:nvCxnSpPr>
+        <p:spPr>
+          <a:xfrm>
+            <a:off x="4704080" y="2596255"/>
+            <a:ext cx="729947" cy="7182"/>
+          </a:xfrm>
+          <a:prstGeom prst="straightConnector1">
+            <a:avLst/>
+          </a:prstGeom>
+          <a:ln w="76200">
+            <a:solidFill>
+              <a:schemeClr val="accent4"/>
+            </a:solidFill>
+            <a:headEnd type="none"/>
+            <a:tailEnd type="triangle"/>
+          </a:ln>
+        </p:spPr>
+        <p:style>
+          <a:lnRef idx="1">
+            <a:schemeClr val="accent1"/>
+          </a:lnRef>
+          <a:fillRef idx="0">
+            <a:schemeClr val="accent1"/>
+          </a:fillRef>
+          <a:effectRef idx="0">
+            <a:schemeClr val="accent1"/>
+          </a:effectRef>
+          <a:fontRef idx="minor">
+            <a:schemeClr val="tx1"/>
+          </a:fontRef>
+        </p:style>
+      </p:cxnSp>
+      <p:sp>
+        <p:nvSpPr>
+          <p:cNvPr id="23" name="Rectangle 22">
+            <a:extLst>
+              <a:ext uri="{FF2B5EF4-FFF2-40B4-BE49-F238E27FC236}">
+                <a16:creationId xmlns:a16="http://schemas.microsoft.com/office/drawing/2014/main" id="{8731834F-C2A0-304E-A345-AE039EA9DFD6}"/>
+              </a:ext>
+            </a:extLst>
+          </p:cNvPr>
+          <p:cNvSpPr/>
+          <p:nvPr/>
+        </p:nvSpPr>
+        <p:spPr>
+          <a:xfrm>
+            <a:off x="9885114" y="1166091"/>
+            <a:ext cx="1696397" cy="1517306"/>
+          </a:xfrm>
+          <a:prstGeom prst="rect">
+            <a:avLst/>
+          </a:prstGeom>
+          <a:solidFill>
+            <a:schemeClr val="accent6"/>
+          </a:solidFill>
+        </p:spPr>
+        <p:style>
+          <a:lnRef idx="2">
+            <a:schemeClr val="accent1">
+              <a:shade val="50000"/>
+            </a:schemeClr>
+          </a:lnRef>
+          <a:fillRef idx="1">
+            <a:schemeClr val="accent1"/>
+          </a:fillRef>
+          <a:effectRef idx="0">
+            <a:schemeClr val="accent1"/>
+          </a:effectRef>
+          <a:fontRef idx="minor">
+            <a:schemeClr val="lt1"/>
+          </a:fontRef>
+        </p:style>
+        <p:txBody>
+          <a:bodyPr rtlCol="0" anchor="ctr"/>
+          <a:lstStyle/>
+          <a:p>
+            <a:pPr algn="ctr"/>
+            <a:r>
+              <a:rPr lang="en-US" dirty="0"/>
+              <a:t>Dynatrace Analysis &amp; Dashboards</a:t>
+            </a:r>
+          </a:p>
+        </p:txBody>
+      </p:sp>
+      <p:sp>
+        <p:nvSpPr>
+          <p:cNvPr id="25" name="Rectangle 24">
+            <a:extLst>
+              <a:ext uri="{FF2B5EF4-FFF2-40B4-BE49-F238E27FC236}">
+                <a16:creationId xmlns:a16="http://schemas.microsoft.com/office/drawing/2014/main" id="{D832ABAC-FBB6-0A4D-970C-668DA9E23529}"/>
+              </a:ext>
+            </a:extLst>
+          </p:cNvPr>
+          <p:cNvSpPr/>
+          <p:nvPr/>
+        </p:nvSpPr>
+        <p:spPr>
+          <a:xfrm>
+            <a:off x="9885113" y="3053196"/>
+            <a:ext cx="1696397" cy="1517306"/>
+          </a:xfrm>
+          <a:prstGeom prst="rect">
+            <a:avLst/>
+          </a:prstGeom>
+          <a:solidFill>
+            <a:schemeClr val="accent6"/>
+          </a:solidFill>
+        </p:spPr>
+        <p:style>
+          <a:lnRef idx="2">
+            <a:schemeClr val="accent1">
+              <a:shade val="50000"/>
+            </a:schemeClr>
+          </a:lnRef>
+          <a:fillRef idx="1">
+            <a:schemeClr val="accent1"/>
+          </a:fillRef>
+          <a:effectRef idx="0">
+            <a:schemeClr val="accent1"/>
+          </a:effectRef>
+          <a:fontRef idx="minor">
+            <a:schemeClr val="lt1"/>
+          </a:fontRef>
+        </p:style>
+        <p:txBody>
+          <a:bodyPr rtlCol="0" anchor="ctr"/>
+          <a:lstStyle/>
+          <a:p>
+            <a:pPr algn="ctr"/>
+            <a:r>
+              <a:rPr lang="en-US" dirty="0"/>
+              <a:t>Dynatrace Metric Event for Alerting</a:t>
+            </a:r>
+          </a:p>
+        </p:txBody>
+      </p:sp>
+      <p:cxnSp>
+        <p:nvCxnSpPr>
+          <p:cNvPr id="26" name="Straight Arrow Connector 25">
+            <a:extLst>
+              <a:ext uri="{FF2B5EF4-FFF2-40B4-BE49-F238E27FC236}">
+                <a16:creationId xmlns:a16="http://schemas.microsoft.com/office/drawing/2014/main" id="{8A894DE8-5F4D-7344-8ADF-211EEAB42528}"/>
+              </a:ext>
+            </a:extLst>
+          </p:cNvPr>
+          <p:cNvCxnSpPr>
+            <a:cxnSpLocks/>
+          </p:cNvCxnSpPr>
+          <p:nvPr/>
+        </p:nvCxnSpPr>
+        <p:spPr>
+          <a:xfrm>
+            <a:off x="9191016" y="2480216"/>
+            <a:ext cx="729947" cy="7182"/>
+          </a:xfrm>
+          <a:prstGeom prst="straightConnector1">
+            <a:avLst/>
+          </a:prstGeom>
+          <a:ln w="76200">
+            <a:solidFill>
+              <a:schemeClr val="accent4"/>
+            </a:solidFill>
+            <a:headEnd type="none"/>
+            <a:tailEnd type="triangle"/>
+          </a:ln>
+        </p:spPr>
+        <p:style>
+          <a:lnRef idx="1">
+            <a:schemeClr val="accent1"/>
+          </a:lnRef>
+          <a:fillRef idx="0">
+            <a:schemeClr val="accent1"/>
+          </a:fillRef>
+          <a:effectRef idx="0">
+            <a:schemeClr val="accent1"/>
+          </a:effectRef>
+          <a:fontRef idx="minor">
+            <a:schemeClr val="tx1"/>
+          </a:fontRef>
+        </p:style>
+      </p:cxnSp>
+      <p:cxnSp>
+        <p:nvCxnSpPr>
+          <p:cNvPr id="27" name="Straight Arrow Connector 26">
+            <a:extLst>
+              <a:ext uri="{FF2B5EF4-FFF2-40B4-BE49-F238E27FC236}">
+                <a16:creationId xmlns:a16="http://schemas.microsoft.com/office/drawing/2014/main" id="{3D94D394-7CD1-E341-B7AD-C3AE97AECF0D}"/>
+              </a:ext>
+            </a:extLst>
+          </p:cNvPr>
+          <p:cNvCxnSpPr>
+            <a:cxnSpLocks/>
+          </p:cNvCxnSpPr>
+          <p:nvPr/>
+        </p:nvCxnSpPr>
+        <p:spPr>
+          <a:xfrm>
+            <a:off x="9191016" y="3508758"/>
+            <a:ext cx="729947" cy="7182"/>
+          </a:xfrm>
+          <a:prstGeom prst="straightConnector1">
+            <a:avLst/>
+          </a:prstGeom>
+          <a:ln w="76200">
+            <a:solidFill>
+              <a:schemeClr val="accent4"/>
+            </a:solidFill>
+            <a:headEnd type="none"/>
+            <a:tailEnd type="triangle"/>
+          </a:ln>
+        </p:spPr>
+        <p:style>
+          <a:lnRef idx="1">
+            <a:schemeClr val="accent1"/>
+          </a:lnRef>
+          <a:fillRef idx="0">
+            <a:schemeClr val="accent1"/>
+          </a:fillRef>
+          <a:effectRef idx="0">
+            <a:schemeClr val="accent1"/>
+          </a:effectRef>
+          <a:fontRef idx="minor">
+            <a:schemeClr val="tx1"/>
+          </a:fontRef>
+        </p:style>
+      </p:cxnSp>
+      <p:sp>
+        <p:nvSpPr>
+          <p:cNvPr id="28" name="Rectangle 27">
+            <a:extLst>
+              <a:ext uri="{FF2B5EF4-FFF2-40B4-BE49-F238E27FC236}">
+                <a16:creationId xmlns:a16="http://schemas.microsoft.com/office/drawing/2014/main" id="{412919AF-508B-BE45-B12A-EDA4EE5BACB0}"/>
+              </a:ext>
+            </a:extLst>
+          </p:cNvPr>
+          <p:cNvSpPr/>
+          <p:nvPr/>
+        </p:nvSpPr>
+        <p:spPr>
+          <a:xfrm>
+            <a:off x="9920963" y="5136300"/>
+            <a:ext cx="1696397" cy="834853"/>
+          </a:xfrm>
+          <a:prstGeom prst="rect">
+            <a:avLst/>
+          </a:prstGeom>
+          <a:solidFill>
+            <a:schemeClr val="accent6"/>
+          </a:solidFill>
+        </p:spPr>
+        <p:style>
+          <a:lnRef idx="2">
+            <a:schemeClr val="accent1">
+              <a:shade val="50000"/>
+            </a:schemeClr>
+          </a:lnRef>
+          <a:fillRef idx="1">
+            <a:schemeClr val="accent1"/>
+          </a:fillRef>
+          <a:effectRef idx="0">
+            <a:schemeClr val="accent1"/>
+          </a:effectRef>
+          <a:fontRef idx="minor">
+            <a:schemeClr val="lt1"/>
+          </a:fontRef>
+        </p:style>
+        <p:txBody>
+          <a:bodyPr rtlCol="0" anchor="ctr"/>
+          <a:lstStyle/>
+          <a:p>
+            <a:pPr algn="ctr"/>
+            <a:r>
+              <a:rPr lang="en-US" dirty="0"/>
+              <a:t>Dynatrace Davis AI Engine</a:t>
+            </a:r>
+          </a:p>
+        </p:txBody>
+      </p:sp>
+      <p:cxnSp>
+        <p:nvCxnSpPr>
+          <p:cNvPr id="29" name="Straight Arrow Connector 28">
+            <a:extLst>
+              <a:ext uri="{FF2B5EF4-FFF2-40B4-BE49-F238E27FC236}">
+                <a16:creationId xmlns:a16="http://schemas.microsoft.com/office/drawing/2014/main" id="{0C250DC8-26CE-6042-A068-E8F787D7CAE7}"/>
+              </a:ext>
+            </a:extLst>
+          </p:cNvPr>
+          <p:cNvCxnSpPr>
+            <a:cxnSpLocks/>
+            <a:endCxn id="28" idx="0"/>
+          </p:cNvCxnSpPr>
+          <p:nvPr/>
+        </p:nvCxnSpPr>
+        <p:spPr>
+          <a:xfrm>
+            <a:off x="10769161" y="4563320"/>
+            <a:ext cx="1" cy="572980"/>
+          </a:xfrm>
+          <a:prstGeom prst="straightConnector1">
+            <a:avLst/>
+          </a:prstGeom>
+          <a:ln w="76200">
+            <a:solidFill>
+              <a:schemeClr val="accent4"/>
+            </a:solidFill>
+            <a:headEnd type="none"/>
+            <a:tailEnd type="triangle"/>
+          </a:ln>
+        </p:spPr>
+        <p:style>
+          <a:lnRef idx="1">
+            <a:schemeClr val="accent1"/>
+          </a:lnRef>
+          <a:fillRef idx="0">
+            <a:schemeClr val="accent1"/>
+          </a:fillRef>
+          <a:effectRef idx="0">
+            <a:schemeClr val="accent1"/>
+          </a:effectRef>
+          <a:fontRef idx="minor">
+            <a:schemeClr val="tx1"/>
+          </a:fontRef>
+        </p:style>
+      </p:cxnSp>
+      <p:sp>
+        <p:nvSpPr>
+          <p:cNvPr id="32" name="Rectangle 31">
+            <a:extLst>
+              <a:ext uri="{FF2B5EF4-FFF2-40B4-BE49-F238E27FC236}">
+                <a16:creationId xmlns:a16="http://schemas.microsoft.com/office/drawing/2014/main" id="{B3415922-71FF-564C-866E-CC21906CE0F6}"/>
+              </a:ext>
+            </a:extLst>
+          </p:cNvPr>
+          <p:cNvSpPr/>
+          <p:nvPr/>
+        </p:nvSpPr>
+        <p:spPr>
+          <a:xfrm>
+            <a:off x="6734628" y="5166570"/>
+            <a:ext cx="2563949" cy="834853"/>
+          </a:xfrm>
+          <a:prstGeom prst="rect">
+            <a:avLst/>
+          </a:prstGeom>
+          <a:solidFill>
+            <a:schemeClr val="accent6"/>
+          </a:solidFill>
+        </p:spPr>
+        <p:style>
+          <a:lnRef idx="2">
+            <a:schemeClr val="accent1">
+              <a:shade val="50000"/>
+            </a:schemeClr>
+          </a:lnRef>
+          <a:fillRef idx="1">
+            <a:schemeClr val="accent1"/>
+          </a:fillRef>
+          <a:effectRef idx="0">
+            <a:schemeClr val="accent1"/>
+          </a:effectRef>
+          <a:fontRef idx="minor">
+            <a:schemeClr val="lt1"/>
+          </a:fontRef>
+        </p:style>
+        <p:txBody>
+          <a:bodyPr rtlCol="0" anchor="ctr"/>
+          <a:lstStyle/>
+          <a:p>
+            <a:pPr algn="ctr"/>
+            <a:r>
+              <a:rPr lang="en-US" dirty="0"/>
+              <a:t>Dynatrace Problem Notification and Cloud Automation</a:t>
+            </a:r>
+          </a:p>
+        </p:txBody>
+      </p:sp>
+      <p:cxnSp>
+        <p:nvCxnSpPr>
+          <p:cNvPr id="36" name="Straight Arrow Connector 35">
+            <a:extLst>
+              <a:ext uri="{FF2B5EF4-FFF2-40B4-BE49-F238E27FC236}">
+                <a16:creationId xmlns:a16="http://schemas.microsoft.com/office/drawing/2014/main" id="{4655443D-9F25-E945-9B62-405537DAF74A}"/>
+              </a:ext>
+            </a:extLst>
+          </p:cNvPr>
+          <p:cNvCxnSpPr>
+            <a:cxnSpLocks/>
+            <a:endCxn id="32" idx="3"/>
+          </p:cNvCxnSpPr>
+          <p:nvPr/>
+        </p:nvCxnSpPr>
+        <p:spPr>
+          <a:xfrm flipH="1">
+            <a:off x="9298577" y="5553726"/>
+            <a:ext cx="622388" cy="30271"/>
+          </a:xfrm>
+          <a:prstGeom prst="straightConnector1">
+            <a:avLst/>
+          </a:prstGeom>
+          <a:ln w="76200">
+            <a:solidFill>
+              <a:schemeClr val="accent4"/>
+            </a:solidFill>
+            <a:headEnd type="none"/>
+            <a:tailEnd type="triangle"/>
+          </a:ln>
+        </p:spPr>
+        <p:style>
+          <a:lnRef idx="1">
+            <a:schemeClr val="accent1"/>
+          </a:lnRef>
+          <a:fillRef idx="0">
+            <a:schemeClr val="accent1"/>
+          </a:fillRef>
+          <a:effectRef idx="0">
+            <a:schemeClr val="accent1"/>
+          </a:effectRef>
+          <a:fontRef idx="minor">
+            <a:schemeClr val="tx1"/>
+          </a:fontRef>
+        </p:style>
+      </p:cxnSp>
+      <p:sp>
+        <p:nvSpPr>
+          <p:cNvPr id="43" name="Rectangle 42">
+            <a:extLst>
+              <a:ext uri="{FF2B5EF4-FFF2-40B4-BE49-F238E27FC236}">
+                <a16:creationId xmlns:a16="http://schemas.microsoft.com/office/drawing/2014/main" id="{84753DBA-7C0B-0A4F-9604-1A753A811AD1}"/>
+              </a:ext>
+            </a:extLst>
+          </p:cNvPr>
+          <p:cNvSpPr/>
+          <p:nvPr/>
+        </p:nvSpPr>
+        <p:spPr>
+          <a:xfrm>
+            <a:off x="3339373" y="5136300"/>
+            <a:ext cx="2563950" cy="1351486"/>
+          </a:xfrm>
+          <a:prstGeom prst="rect">
+            <a:avLst/>
+          </a:prstGeom>
+          <a:solidFill>
+            <a:schemeClr val="bg1">
+              <a:lumMod val="75000"/>
+            </a:schemeClr>
+          </a:solidFill>
+        </p:spPr>
+        <p:style>
+          <a:lnRef idx="2">
+            <a:schemeClr val="accent1">
+              <a:shade val="50000"/>
+            </a:schemeClr>
+          </a:lnRef>
+          <a:fillRef idx="1">
+            <a:schemeClr val="accent1"/>
+          </a:fillRef>
+          <a:effectRef idx="0">
+            <a:schemeClr val="accent1"/>
+          </a:effectRef>
+          <a:fontRef idx="minor">
+            <a:schemeClr val="lt1"/>
+          </a:fontRef>
+        </p:style>
+        <p:txBody>
+          <a:bodyPr rtlCol="0" anchor="ctr"/>
+          <a:lstStyle/>
+          <a:p>
+            <a:pPr algn="ctr"/>
+            <a:r>
+              <a:rPr lang="en-US" dirty="0">
+                <a:solidFill>
+                  <a:schemeClr val="tx1"/>
+                </a:solidFill>
+              </a:rPr>
+              <a:t>Incident and Change Management workflows with partner tools (e.g. PagerDuty, </a:t>
+            </a:r>
+            <a:r>
+              <a:rPr lang="en-US" dirty="0" err="1">
+                <a:solidFill>
+                  <a:schemeClr val="tx1"/>
+                </a:solidFill>
+              </a:rPr>
+              <a:t>xmatter</a:t>
+            </a:r>
+            <a:r>
+              <a:rPr lang="en-US" dirty="0">
+                <a:solidFill>
+                  <a:schemeClr val="tx1"/>
+                </a:solidFill>
+              </a:rPr>
+              <a:t>, </a:t>
+            </a:r>
+            <a:r>
+              <a:rPr lang="en-US" dirty="0" err="1">
+                <a:solidFill>
+                  <a:schemeClr val="tx1"/>
+                </a:solidFill>
+              </a:rPr>
+              <a:t>etc</a:t>
+            </a:r>
+            <a:r>
+              <a:rPr lang="en-US" dirty="0">
+                <a:solidFill>
+                  <a:schemeClr val="tx1"/>
+                </a:solidFill>
+              </a:rPr>
+              <a:t>)</a:t>
+            </a:r>
+          </a:p>
+        </p:txBody>
+      </p:sp>
+      <p:cxnSp>
+        <p:nvCxnSpPr>
+          <p:cNvPr id="44" name="Straight Arrow Connector 43">
+            <a:extLst>
+              <a:ext uri="{FF2B5EF4-FFF2-40B4-BE49-F238E27FC236}">
+                <a16:creationId xmlns:a16="http://schemas.microsoft.com/office/drawing/2014/main" id="{C57EE603-80BF-4041-B561-DCB543EC7C93}"/>
+              </a:ext>
+            </a:extLst>
+          </p:cNvPr>
+          <p:cNvCxnSpPr>
+            <a:cxnSpLocks/>
+          </p:cNvCxnSpPr>
+          <p:nvPr/>
+        </p:nvCxnSpPr>
+        <p:spPr>
+          <a:xfrm flipH="1">
+            <a:off x="5985546" y="5583996"/>
+            <a:ext cx="622388" cy="30271"/>
+          </a:xfrm>
+          <a:prstGeom prst="straightConnector1">
+            <a:avLst/>
+          </a:prstGeom>
+          <a:ln w="76200">
+            <a:solidFill>
+              <a:schemeClr val="accent4"/>
+            </a:solidFill>
+            <a:headEnd type="none"/>
+            <a:tailEnd type="triangle"/>
+          </a:ln>
+        </p:spPr>
+        <p:style>
+          <a:lnRef idx="1">
+            <a:schemeClr val="accent1"/>
+          </a:lnRef>
+          <a:fillRef idx="0">
+            <a:schemeClr val="accent1"/>
+          </a:fillRef>
+          <a:effectRef idx="0">
+            <a:schemeClr val="accent1"/>
+          </a:effectRef>
+          <a:fontRef idx="minor">
+            <a:schemeClr val="tx1"/>
+          </a:fontRef>
+        </p:style>
+      </p:cxnSp>
+      <p:sp>
+        <p:nvSpPr>
+          <p:cNvPr id="46" name="TextBox 45">
+            <a:extLst>
+              <a:ext uri="{FF2B5EF4-FFF2-40B4-BE49-F238E27FC236}">
+                <a16:creationId xmlns:a16="http://schemas.microsoft.com/office/drawing/2014/main" id="{CD3B399C-E807-2140-93EC-775BE8213DDC}"/>
+              </a:ext>
+            </a:extLst>
+          </p:cNvPr>
+          <p:cNvSpPr txBox="1"/>
+          <p:nvPr/>
+        </p:nvSpPr>
+        <p:spPr>
+          <a:xfrm>
+            <a:off x="649489" y="370214"/>
+            <a:ext cx="6100174" cy="523220"/>
+          </a:xfrm>
+          <a:prstGeom prst="rect">
+            <a:avLst/>
+          </a:prstGeom>
+          <a:noFill/>
+        </p:spPr>
+        <p:txBody>
+          <a:bodyPr wrap="square">
+            <a:spAutoFit/>
+          </a:bodyPr>
+          <a:lstStyle/>
+          <a:p>
+            <a:r>
+              <a:rPr lang="en-US" sz="2800" b="1" dirty="0">
+                <a:solidFill>
+                  <a:schemeClr val="tx1"/>
+                </a:solidFill>
+              </a:rPr>
+              <a:t>End to End Flow</a:t>
+            </a:r>
+            <a:endParaRPr lang="en-US" sz="2800" b="1" dirty="0"/>
+          </a:p>
+        </p:txBody>
+      </p:sp>
+    </p:spTree>
+    <p:extLst>
+      <p:ext uri="{BB962C8B-B14F-4D97-AF65-F5344CB8AC3E}">
+        <p14:creationId xmlns:p14="http://schemas.microsoft.com/office/powerpoint/2010/main" val="511933139"/>
+      </p:ext>
+    </p:extLst>
+  </p:cSld>
+  <p:clrMapOvr>
+    <a:masterClrMapping/>
+  </p:clrMapOvr>
+</p:sld>
+</file>
+
 <file path=ppt/theme/theme1.xml><?xml version="1.0" encoding="utf-8"?>
 <a:theme xmlns:a="http://schemas.openxmlformats.org/drawingml/2006/main" name="Office Theme">
   <a:themeElements>
@@ -3779,4 +8238,299 @@
     </a:ext>
   </a:extLst>
 </a:theme>
+</file>
+
+<file path=ppt/theme/theme2.xml><?xml version="1.0" encoding="utf-8"?>
+<a:theme xmlns:a="http://schemas.openxmlformats.org/drawingml/2006/main" name="Office Theme">
+  <a:themeElements>
+    <a:clrScheme name="Office">
+      <a:dk1>
+        <a:sysClr val="windowText" lastClr="000000"/>
+      </a:dk1>
+      <a:lt1>
+        <a:sysClr val="window" lastClr="FFFFFF"/>
+      </a:lt1>
+      <a:dk2>
+        <a:srgbClr val="44546A"/>
+      </a:dk2>
+      <a:lt2>
+        <a:srgbClr val="E7E6E6"/>
+      </a:lt2>
+      <a:accent1>
+        <a:srgbClr val="4472C4"/>
+      </a:accent1>
+      <a:accent2>
+        <a:srgbClr val="ED7D31"/>
+      </a:accent2>
+      <a:accent3>
+        <a:srgbClr val="A5A5A5"/>
+      </a:accent3>
+      <a:accent4>
+        <a:srgbClr val="FFC000"/>
+      </a:accent4>
+      <a:accent5>
+        <a:srgbClr val="5B9BD5"/>
+      </a:accent5>
+      <a:accent6>
+        <a:srgbClr val="70AD47"/>
+      </a:accent6>
+      <a:hlink>
+        <a:srgbClr val="0563C1"/>
+      </a:hlink>
+      <a:folHlink>
+        <a:srgbClr val="954F72"/>
+      </a:folHlink>
+    </a:clrScheme>
+    <a:fontScheme name="Office">
+      <a:majorFont>
+        <a:latin typeface="Calibri Light" panose="020F0302020204030204"/>
+        <a:ea typeface=""/>
+        <a:cs typeface=""/>
+        <a:font script="Jpan" typeface="游ゴシック Light"/>
+        <a:font script="Hang" typeface="맑은 고딕"/>
+        <a:font script="Hans" typeface="等线 Light"/>
+        <a:font script="Hant" typeface="新細明體"/>
+        <a:font script="Arab" typeface="Times New Roman"/>
+        <a:font script="Hebr" typeface="Times New Roman"/>
+        <a:font script="Thai" typeface="Angsana New"/>
+        <a:font script="Ethi" typeface="Nyala"/>
+        <a:font script="Beng" typeface="Vrinda"/>
+        <a:font script="Gujr" typeface="Shruti"/>
+        <a:font script="Khmr" typeface="MoolBoran"/>
+        <a:font script="Knda" typeface="Tunga"/>
+        <a:font script="Guru" typeface="Raavi"/>
+        <a:font script="Cans" typeface="Euphemia"/>
+        <a:font script="Cher" typeface="Plantagenet Cherokee"/>
+        <a:font script="Yiii" typeface="Microsoft Yi Baiti"/>
+        <a:font script="Tibt" typeface="Microsoft Himalaya"/>
+        <a:font script="Thaa" typeface="MV Boli"/>
+        <a:font script="Deva" typeface="Mangal"/>
+        <a:font script="Telu" typeface="Gautami"/>
+        <a:font script="Taml" typeface="Latha"/>
+        <a:font script="Syrc" typeface="Estrangelo Edessa"/>
+        <a:font script="Orya" typeface="Kalinga"/>
+        <a:font script="Mlym" typeface="Kartika"/>
+        <a:font script="Laoo" typeface="DokChampa"/>
+        <a:font script="Sinh" typeface="Iskoola Pota"/>
+        <a:font script="Mong" typeface="Mongolian Baiti"/>
+        <a:font script="Viet" typeface="Times New Roman"/>
+        <a:font script="Uigh" typeface="Microsoft Uighur"/>
+        <a:font script="Geor" typeface="Sylfaen"/>
+        <a:font script="Armn" typeface="Arial"/>
+        <a:font script="Bugi" typeface="Leelawadee UI"/>
+        <a:font script="Bopo" typeface="Microsoft JhengHei"/>
+        <a:font script="Java" typeface="Javanese Text"/>
+        <a:font script="Lisu" typeface="Segoe UI"/>
+        <a:font script="Mymr" typeface="Myanmar Text"/>
+        <a:font script="Nkoo" typeface="Ebrima"/>
+        <a:font script="Olck" typeface="Nirmala UI"/>
+        <a:font script="Osma" typeface="Ebrima"/>
+        <a:font script="Phag" typeface="Phagspa"/>
+        <a:font script="Syrn" typeface="Estrangelo Edessa"/>
+        <a:font script="Syrj" typeface="Estrangelo Edessa"/>
+        <a:font script="Syre" typeface="Estrangelo Edessa"/>
+        <a:font script="Sora" typeface="Nirmala UI"/>
+        <a:font script="Tale" typeface="Microsoft Tai Le"/>
+        <a:font script="Talu" typeface="Microsoft New Tai Lue"/>
+        <a:font script="Tfng" typeface="Ebrima"/>
+      </a:majorFont>
+      <a:minorFont>
+        <a:latin typeface="Calibri" panose="020F0502020204030204"/>
+        <a:ea typeface=""/>
+        <a:cs typeface=""/>
+        <a:font script="Jpan" typeface="游ゴシック"/>
+        <a:font script="Hang" typeface="맑은 고딕"/>
+        <a:font script="Hans" typeface="等线"/>
+        <a:font script="Hant" typeface="新細明體"/>
+        <a:font script="Arab" typeface="Arial"/>
+        <a:font script="Hebr" typeface="Arial"/>
+        <a:font script="Thai" typeface="Cordia New"/>
+        <a:font script="Ethi" typeface="Nyala"/>
+        <a:font script="Beng" typeface="Vrinda"/>
+        <a:font script="Gujr" typeface="Shruti"/>
+        <a:font script="Khmr" typeface="DaunPenh"/>
+        <a:font script="Knda" typeface="Tunga"/>
+        <a:font script="Guru" typeface="Raavi"/>
+        <a:font script="Cans" typeface="Euphemia"/>
+        <a:font script="Cher" typeface="Plantagenet Cherokee"/>
+        <a:font script="Yiii" typeface="Microsoft Yi Baiti"/>
+        <a:font script="Tibt" typeface="Microsoft Himalaya"/>
+        <a:font script="Thaa" typeface="MV Boli"/>
+        <a:font script="Deva" typeface="Mangal"/>
+        <a:font script="Telu" typeface="Gautami"/>
+        <a:font script="Taml" typeface="Latha"/>
+        <a:font script="Syrc" typeface="Estrangelo Edessa"/>
+        <a:font script="Orya" typeface="Kalinga"/>
+        <a:font script="Mlym" typeface="Kartika"/>
+        <a:font script="Laoo" typeface="DokChampa"/>
+        <a:font script="Sinh" typeface="Iskoola Pota"/>
+        <a:font script="Mong" typeface="Mongolian Baiti"/>
+        <a:font script="Viet" typeface="Arial"/>
+        <a:font script="Uigh" typeface="Microsoft Uighur"/>
+        <a:font script="Geor" typeface="Sylfaen"/>
+        <a:font script="Armn" typeface="Arial"/>
+        <a:font script="Bugi" typeface="Leelawadee UI"/>
+        <a:font script="Bopo" typeface="Microsoft JhengHei"/>
+        <a:font script="Java" typeface="Javanese Text"/>
+        <a:font script="Lisu" typeface="Segoe UI"/>
+        <a:font script="Mymr" typeface="Myanmar Text"/>
+        <a:font script="Nkoo" typeface="Ebrima"/>
+        <a:font script="Olck" typeface="Nirmala UI"/>
+        <a:font script="Osma" typeface="Ebrima"/>
+        <a:font script="Phag" typeface="Phagspa"/>
+        <a:font script="Syrn" typeface="Estrangelo Edessa"/>
+        <a:font script="Syrj" typeface="Estrangelo Edessa"/>
+        <a:font script="Syre" typeface="Estrangelo Edessa"/>
+        <a:font script="Sora" typeface="Nirmala UI"/>
+        <a:font script="Tale" typeface="Microsoft Tai Le"/>
+        <a:font script="Talu" typeface="Microsoft New Tai Lue"/>
+        <a:font script="Tfng" typeface="Ebrima"/>
+      </a:minorFont>
+    </a:fontScheme>
+    <a:fmtScheme name="Office">
+      <a:fillStyleLst>
+        <a:solidFill>
+          <a:schemeClr val="phClr"/>
+        </a:solidFill>
+        <a:gradFill rotWithShape="1">
+          <a:gsLst>
+            <a:gs pos="0">
+              <a:schemeClr val="phClr">
+                <a:lumMod val="110000"/>
+                <a:satMod val="105000"/>
+                <a:tint val="67000"/>
+              </a:schemeClr>
+            </a:gs>
+            <a:gs pos="50000">
+              <a:schemeClr val="phClr">
+                <a:lumMod val="105000"/>
+                <a:satMod val="103000"/>
+                <a:tint val="73000"/>
+              </a:schemeClr>
+            </a:gs>
+            <a:gs pos="100000">
+              <a:schemeClr val="phClr">
+                <a:lumMod val="105000"/>
+                <a:satMod val="109000"/>
+                <a:tint val="81000"/>
+              </a:schemeClr>
+            </a:gs>
+          </a:gsLst>
+          <a:lin ang="5400000" scaled="0"/>
+        </a:gradFill>
+        <a:gradFill rotWithShape="1">
+          <a:gsLst>
+            <a:gs pos="0">
+              <a:schemeClr val="phClr">
+                <a:satMod val="103000"/>
+                <a:lumMod val="102000"/>
+                <a:tint val="94000"/>
+              </a:schemeClr>
+            </a:gs>
+            <a:gs pos="50000">
+              <a:schemeClr val="phClr">
+                <a:satMod val="110000"/>
+                <a:lumMod val="100000"/>
+                <a:shade val="100000"/>
+              </a:schemeClr>
+            </a:gs>
+            <a:gs pos="100000">
+              <a:schemeClr val="phClr">
+                <a:lumMod val="99000"/>
+                <a:satMod val="120000"/>
+                <a:shade val="78000"/>
+              </a:schemeClr>
+            </a:gs>
+          </a:gsLst>
+          <a:lin ang="5400000" scaled="0"/>
+        </a:gradFill>
+      </a:fillStyleLst>
+      <a:lnStyleLst>
+        <a:ln w="6350" cap="flat" cmpd="sng" algn="ctr">
+          <a:solidFill>
+            <a:schemeClr val="phClr"/>
+          </a:solidFill>
+          <a:prstDash val="solid"/>
+          <a:miter lim="800000"/>
+        </a:ln>
+        <a:ln w="12700" cap="flat" cmpd="sng" algn="ctr">
+          <a:solidFill>
+            <a:schemeClr val="phClr"/>
+          </a:solidFill>
+          <a:prstDash val="solid"/>
+          <a:miter lim="800000"/>
+        </a:ln>
+        <a:ln w="19050" cap="flat" cmpd="sng" algn="ctr">
+          <a:solidFill>
+            <a:schemeClr val="phClr"/>
+          </a:solidFill>
+          <a:prstDash val="solid"/>
+          <a:miter lim="800000"/>
+        </a:ln>
+      </a:lnStyleLst>
+      <a:effectStyleLst>
+        <a:effectStyle>
+          <a:effectLst/>
+        </a:effectStyle>
+        <a:effectStyle>
+          <a:effectLst/>
+        </a:effectStyle>
+        <a:effectStyle>
+          <a:effectLst>
+            <a:outerShdw blurRad="57150" dist="19050" dir="5400000" algn="ctr" rotWithShape="0">
+              <a:srgbClr val="000000">
+                <a:alpha val="63000"/>
+              </a:srgbClr>
+            </a:outerShdw>
+          </a:effectLst>
+        </a:effectStyle>
+      </a:effectStyleLst>
+      <a:bgFillStyleLst>
+        <a:solidFill>
+          <a:schemeClr val="phClr"/>
+        </a:solidFill>
+        <a:solidFill>
+          <a:schemeClr val="phClr">
+            <a:tint val="95000"/>
+            <a:satMod val="170000"/>
+          </a:schemeClr>
+        </a:solidFill>
+        <a:gradFill rotWithShape="1">
+          <a:gsLst>
+            <a:gs pos="0">
+              <a:schemeClr val="phClr">
+                <a:tint val="93000"/>
+                <a:satMod val="150000"/>
+                <a:shade val="98000"/>
+                <a:lumMod val="102000"/>
+              </a:schemeClr>
+            </a:gs>
+            <a:gs pos="50000">
+              <a:schemeClr val="phClr">
+                <a:tint val="98000"/>
+                <a:satMod val="130000"/>
+                <a:shade val="90000"/>
+                <a:lumMod val="103000"/>
+              </a:schemeClr>
+            </a:gs>
+            <a:gs pos="100000">
+              <a:schemeClr val="phClr">
+                <a:shade val="63000"/>
+                <a:satMod val="120000"/>
+              </a:schemeClr>
+            </a:gs>
+          </a:gsLst>
+          <a:lin ang="5400000" scaled="0"/>
+        </a:gradFill>
+      </a:bgFillStyleLst>
+    </a:fmtScheme>
+  </a:themeElements>
+  <a:objectDefaults/>
+  <a:extraClrSchemeLst/>
+  <a:extLst>
+    <a:ext uri="{05A4C25C-085E-4340-85A3-A5531E510DB2}">
+      <thm15:themeFamily xmlns:thm15="http://schemas.microsoft.com/office/thememl/2012/main" name="Office Theme" id="{62F939B6-93AF-4DB8-9C6B-D6C7DFDC589F}" vid="{4A3C46E8-61CC-4603-A589-7422A47A8E4A}"/>
+    </a:ext>
+  </a:extLst>
+</a:theme>
 </file>
</xml_diff>